<commit_message>
Refactor home, request pickup, and swap templates; enhance user experience with dynamic neighborhood selection, date logic, and EcoCoin swap functionality. Update database schema.
</commit_message>
<xml_diff>
--- a/Vericycle Pitch Deck.pptx
+++ b/Vericycle Pitch Deck.pptx
@@ -287,12 +287,20 @@
 </p:presentation>
 </file>
 
+<file path=ppt/revisionInfo.xml><?xml version="1.0" encoding="utf-8"?>
+<p1510:revInfo xmlns:a="http://schemas.openxmlformats.org/drawingml/2006/main" xmlns:r="http://schemas.openxmlformats.org/officeDocument/2006/relationships" xmlns:p1510="http://schemas.microsoft.com/office/powerpoint/2015/10/main">
+  <p1510:revLst>
+    <p1510:client id="{BADD8881-CF52-44A3-AC4A-94C3126486E0}" v="12" dt="2025-11-15T19:45:41.680"/>
+  </p1510:revLst>
+</p1510:revInfo>
+</file>
+
 <file path=ppt/changesInfos/changesInfo1.xml><?xml version="1.0" encoding="utf-8"?>
 <pc:chgInfo xmlns:a="http://schemas.openxmlformats.org/drawingml/2006/main" xmlns:r="http://schemas.openxmlformats.org/officeDocument/2006/relationships" xmlns:ac="http://schemas.microsoft.com/office/drawing/2013/main/command" xmlns:pc="http://schemas.microsoft.com/office/powerpoint/2013/main/command">
   <pc:docChgLst>
     <pc:chgData name="Noma Ncube" userId="c5bd3073de45acf7" providerId="LiveId" clId="{94FB0B1B-DAC1-4DF4-852D-A426A8D32563}"/>
-    <pc:docChg chg="modSld">
-      <pc:chgData name="Noma Ncube" userId="c5bd3073de45acf7" providerId="LiveId" clId="{94FB0B1B-DAC1-4DF4-852D-A426A8D32563}" dt="2025-11-15T18:15:17.007" v="2" actId="13926"/>
+    <pc:docChg chg="undo custSel modSld">
+      <pc:chgData name="Noma Ncube" userId="c5bd3073de45acf7" providerId="LiveId" clId="{94FB0B1B-DAC1-4DF4-852D-A426A8D32563}" dt="2025-11-15T19:45:31.575" v="82" actId="20577"/>
       <pc:docMkLst>
         <pc:docMk/>
       </pc:docMkLst>
@@ -308,6 +316,37 @@
             <pc:docMk/>
             <pc:sldMk cId="0" sldId="279"/>
             <ac:spMk id="17" creationId="{B9382C23-C133-4E00-4054-1DEAF3486BE9}"/>
+          </ac:spMkLst>
+        </pc:spChg>
+      </pc:sldChg>
+      <pc:sldChg chg="addSp modSp mod">
+        <pc:chgData name="Noma Ncube" userId="c5bd3073de45acf7" providerId="LiveId" clId="{94FB0B1B-DAC1-4DF4-852D-A426A8D32563}" dt="2025-11-15T19:45:31.575" v="82" actId="20577"/>
+        <pc:sldMkLst>
+          <pc:docMk/>
+          <pc:sldMk cId="3907859258" sldId="322"/>
+        </pc:sldMkLst>
+        <pc:spChg chg="add">
+          <ac:chgData name="Noma Ncube" userId="c5bd3073de45acf7" providerId="LiveId" clId="{94FB0B1B-DAC1-4DF4-852D-A426A8D32563}" dt="2025-11-15T19:27:18.631" v="3"/>
+          <ac:spMkLst>
+            <pc:docMk/>
+            <pc:sldMk cId="3907859258" sldId="322"/>
+            <ac:spMk id="2" creationId="{343C3824-8B21-DFF4-3595-9569096E50F8}"/>
+          </ac:spMkLst>
+        </pc:spChg>
+        <pc:spChg chg="add mod">
+          <ac:chgData name="Noma Ncube" userId="c5bd3073de45acf7" providerId="LiveId" clId="{94FB0B1B-DAC1-4DF4-852D-A426A8D32563}" dt="2025-11-15T19:27:34.893" v="7"/>
+          <ac:spMkLst>
+            <pc:docMk/>
+            <pc:sldMk cId="3907859258" sldId="322"/>
+            <ac:spMk id="3" creationId="{0F6C6FEA-ECB6-4C5F-5F73-768067ACFA0B}"/>
+          </ac:spMkLst>
+        </pc:spChg>
+        <pc:spChg chg="mod">
+          <ac:chgData name="Noma Ncube" userId="c5bd3073de45acf7" providerId="LiveId" clId="{94FB0B1B-DAC1-4DF4-852D-A426A8D32563}" dt="2025-11-15T19:45:31.575" v="82" actId="20577"/>
+          <ac:spMkLst>
+            <pc:docMk/>
+            <pc:sldMk cId="3907859258" sldId="322"/>
+            <ac:spMk id="676" creationId="{F0DE0544-F81C-D71C-B2F9-2C932DB63758}"/>
           </ac:spMkLst>
         </pc:spChg>
       </pc:sldChg>
@@ -24982,8 +25021,8 @@
         </p:nvSpPr>
         <p:spPr>
           <a:xfrm>
-            <a:off x="350551" y="1005840"/>
-            <a:ext cx="8173249" cy="4395488"/>
+            <a:off x="152400" y="910500"/>
+            <a:ext cx="9144000" cy="4395488"/>
           </a:xfrm>
           <a:prstGeom prst="rect">
             <a:avLst/>
@@ -25010,7 +25049,7 @@
               <a:buChar char="●"/>
             </a:pPr>
             <a:r>
-              <a:rPr lang="en-GB" sz="2000" dirty="0">
+              <a:rPr lang="en-GB" sz="1600" dirty="0">
                 <a:solidFill>
                   <a:schemeClr val="accent1"/>
                 </a:solidFill>
@@ -25021,29 +25060,22 @@
               <a:t>EcoCoin (HTS): </a:t>
             </a:r>
             <a:r>
-              <a:rPr lang="en-GB" sz="2000" b="1" dirty="0">
+              <a:rPr lang="en-GB" sz="1600" dirty="0">
                 <a:solidFill>
-                  <a:schemeClr val="dk1"/>
+                  <a:schemeClr val="accent1"/>
                 </a:solidFill>
+                <a:uFill>
+                  <a:noFill/>
+                </a:uFill>
+                <a:hlinkClick r:id="rId3"/>
               </a:rPr>
-              <a:t>[Your Full </a:t>
+              <a:t>https://hashscan.io/testnet/token/0.0.7189125</a:t>
             </a:r>
-            <a:r>
-              <a:rPr lang="en-GB" sz="2000" b="1" dirty="0" err="1">
-                <a:solidFill>
-                  <a:schemeClr val="dk1"/>
-                </a:solidFill>
-              </a:rPr>
-              <a:t>Hashscan</a:t>
-            </a:r>
-            <a:r>
-              <a:rPr lang="en-GB" sz="2000" b="1" dirty="0">
-                <a:solidFill>
-                  <a:schemeClr val="dk1"/>
-                </a:solidFill>
-              </a:rPr>
-              <a:t> Link for the Token ID]</a:t>
-            </a:r>
+            <a:endParaRPr lang="en-GB" sz="1600" b="1" dirty="0">
+              <a:uFill>
+                <a:noFill/>
+              </a:uFill>
+            </a:endParaRPr>
           </a:p>
           <a:p>
             <a:pPr marL="914400" lvl="0" indent="-304800" algn="l" rtl="0">
@@ -25061,7 +25093,7 @@
               <a:buChar char="●"/>
             </a:pPr>
             <a:r>
-              <a:rPr lang="en-GB" sz="2000" dirty="0">
+              <a:rPr lang="en-GB" sz="1600" dirty="0">
                 <a:solidFill>
                   <a:schemeClr val="accent1"/>
                 </a:solidFill>
@@ -25072,29 +25104,22 @@
               <a:t>VeriCycle Logbook (HCS): </a:t>
             </a:r>
             <a:r>
-              <a:rPr lang="en-GB" sz="2000" b="1" dirty="0">
+              <a:rPr lang="en-GB" sz="1600" dirty="0">
                 <a:solidFill>
-                  <a:schemeClr val="dk1"/>
+                  <a:schemeClr val="accent1"/>
                 </a:solidFill>
+                <a:uFill>
+                  <a:noFill/>
+                </a:uFill>
+                <a:hlinkClick r:id="rId4"/>
               </a:rPr>
-              <a:t>[Your Full </a:t>
+              <a:t>https://hashscan.io/testnet/topic/0.0.7191601</a:t>
             </a:r>
-            <a:r>
-              <a:rPr lang="en-GB" sz="2000" b="1" dirty="0" err="1">
-                <a:solidFill>
-                  <a:schemeClr val="dk1"/>
-                </a:solidFill>
-              </a:rPr>
-              <a:t>Hashscan</a:t>
-            </a:r>
-            <a:r>
-              <a:rPr lang="en-GB" sz="2000" b="1" dirty="0">
-                <a:solidFill>
-                  <a:schemeClr val="dk1"/>
-                </a:solidFill>
-              </a:rPr>
-              <a:t> Link for the Topic ID]</a:t>
-            </a:r>
+            <a:endParaRPr lang="en-GB" sz="1600" b="1" dirty="0">
+              <a:uFill>
+                <a:noFill/>
+              </a:uFill>
+            </a:endParaRPr>
           </a:p>
           <a:p>
             <a:pPr marL="914400" lvl="0" indent="-304800" algn="l" rtl="0">
@@ -25112,7 +25137,7 @@
               <a:buChar char="●"/>
             </a:pPr>
             <a:r>
-              <a:rPr lang="en-GB" sz="2000" dirty="0">
+              <a:rPr lang="en-GB" sz="1600" dirty="0">
                 <a:solidFill>
                   <a:schemeClr val="accent1"/>
                 </a:solidFill>
@@ -25120,32 +25145,39 @@
                   <a:noFill/>
                 </a:uFill>
               </a:rPr>
-              <a:t>VeriCycle Operator Account: </a:t>
+              <a:t>VeriCycle Operator Account</a:t>
             </a:r>
             <a:r>
-              <a:rPr lang="en-GB" sz="2000" b="1" dirty="0">
+              <a:rPr lang="en-GB" sz="1600">
                 <a:solidFill>
-                  <a:schemeClr val="dk1"/>
+                  <a:schemeClr val="accent1"/>
                 </a:solidFill>
+                <a:uFill>
+                  <a:noFill/>
+                </a:uFill>
               </a:rPr>
-              <a:t>[Your Full </a:t>
+              <a:t>: </a:t>
             </a:r>
             <a:r>
-              <a:rPr lang="en-GB" sz="2000" b="1" dirty="0" err="1">
+              <a:rPr lang="en-GB" sz="1600">
                 <a:solidFill>
-                  <a:schemeClr val="dk1"/>
+                  <a:schemeClr val="accent1"/>
                 </a:solidFill>
+                <a:uFill>
+                  <a:noFill/>
+                </a:uFill>
+                <a:hlinkClick r:id="rId5"/>
               </a:rPr>
-              <a:t>Hashscan</a:t>
+              <a:t>https://hashscan.io/testnet/account/0.0.7108458</a:t>
             </a:r>
-            <a:r>
-              <a:rPr lang="en-GB" sz="2000" b="1" dirty="0">
-                <a:solidFill>
-                  <a:schemeClr val="dk1"/>
-                </a:solidFill>
-              </a:rPr>
-              <a:t> Link for the Account ID]</a:t>
-            </a:r>
+            <a:endParaRPr lang="en-GB" sz="1600">
+              <a:solidFill>
+                <a:schemeClr val="accent1"/>
+              </a:solidFill>
+              <a:uFill>
+                <a:noFill/>
+              </a:uFill>
+            </a:endParaRPr>
           </a:p>
           <a:p>
             <a:pPr marL="914400" lvl="0" indent="-304800" algn="l" rtl="0">
@@ -25163,7 +25195,7 @@
               <a:buChar char="●"/>
             </a:pPr>
             <a:r>
-              <a:rPr lang="en-GB" sz="2000" dirty="0">
+              <a:rPr lang="en-GB" sz="1600" dirty="0">
                 <a:solidFill>
                   <a:schemeClr val="accent1"/>
                 </a:solidFill>
@@ -25174,13 +25206,27 @@
               <a:t>HTS Token Script</a:t>
             </a:r>
             <a:r>
-              <a:rPr lang="en-GB" sz="2000" dirty="0">
+              <a:rPr lang="en-GB" sz="1600" dirty="0">
                 <a:solidFill>
                   <a:schemeClr val="dk1"/>
                 </a:solidFill>
               </a:rPr>
-              <a:t>: [Link to create-token.js on GitHub]</a:t>
+              <a:t>: </a:t>
             </a:r>
+            <a:r>
+              <a:rPr lang="en-GB" sz="1600" dirty="0">
+                <a:solidFill>
+                  <a:schemeClr val="dk1"/>
+                </a:solidFill>
+                <a:hlinkClick r:id="rId6"/>
+              </a:rPr>
+              <a:t>https://github.com/commit-to-Noma/VeriCycle/blob/main/create-token.js</a:t>
+            </a:r>
+            <a:endParaRPr lang="en-GB" sz="1600" dirty="0">
+              <a:solidFill>
+                <a:schemeClr val="dk1"/>
+              </a:solidFill>
+            </a:endParaRPr>
           </a:p>
           <a:p>
             <a:pPr marL="914400" lvl="0" indent="-304800" algn="l" rtl="0">
@@ -25198,7 +25244,7 @@
               <a:buChar char="●"/>
             </a:pPr>
             <a:r>
-              <a:rPr lang="en-GB" sz="2000" dirty="0">
+              <a:rPr lang="en-GB" sz="1600" dirty="0">
                 <a:solidFill>
                   <a:schemeClr val="accent1"/>
                 </a:solidFill>
@@ -25209,13 +25255,27 @@
               <a:t>HCS Logbook Script</a:t>
             </a:r>
             <a:r>
-              <a:rPr lang="en-GB" sz="2000" dirty="0">
+              <a:rPr lang="en-GB" sz="1600" dirty="0">
                 <a:solidFill>
                   <a:schemeClr val="dk1"/>
                 </a:solidFill>
               </a:rPr>
-              <a:t>: [Link to logbook.js on GitHub]</a:t>
+              <a:t>: </a:t>
             </a:r>
+            <a:r>
+              <a:rPr lang="en-GB" sz="1600" dirty="0">
+                <a:solidFill>
+                  <a:schemeClr val="dk1"/>
+                </a:solidFill>
+                <a:hlinkClick r:id="rId7"/>
+              </a:rPr>
+              <a:t>https://github.com/commit-to-Noma/VeriCycle/blob/main/logbook.js</a:t>
+            </a:r>
+            <a:endParaRPr lang="en-GB" sz="1600" dirty="0">
+              <a:solidFill>
+                <a:schemeClr val="dk1"/>
+              </a:solidFill>
+            </a:endParaRPr>
           </a:p>
           <a:p>
             <a:pPr marL="914400" lvl="0" indent="-304800" algn="l" rtl="0">
@@ -25233,7 +25293,7 @@
               <a:buChar char="●"/>
             </a:pPr>
             <a:r>
-              <a:rPr lang="en-GB" sz="2000" dirty="0">
+              <a:rPr lang="en-GB" sz="1600" dirty="0">
                 <a:solidFill>
                   <a:schemeClr val="accent1"/>
                 </a:solidFill>
@@ -25244,13 +25304,27 @@
               <a:t>HCS Record Script</a:t>
             </a:r>
             <a:r>
-              <a:rPr lang="en-GB" sz="2000" dirty="0">
+              <a:rPr lang="en-GB" sz="1600" dirty="0">
                 <a:solidFill>
                   <a:schemeClr val="dk1"/>
                 </a:solidFill>
               </a:rPr>
-              <a:t>: [Link to submit-record.js on GitHub]</a:t>
+              <a:t>: </a:t>
             </a:r>
+            <a:r>
+              <a:rPr lang="en-GB" sz="1600" dirty="0">
+                <a:solidFill>
+                  <a:schemeClr val="dk1"/>
+                </a:solidFill>
+                <a:hlinkClick r:id="rId8"/>
+              </a:rPr>
+              <a:t>https://github.com/commit-to-Noma/VeriCycle/blob/main/submit-record.js</a:t>
+            </a:r>
+            <a:endParaRPr lang="en-GB" sz="1600" dirty="0">
+              <a:solidFill>
+                <a:schemeClr val="dk1"/>
+              </a:solidFill>
+            </a:endParaRPr>
           </a:p>
           <a:p>
             <a:pPr marL="914400" lvl="0" indent="-304800" algn="l" rtl="0">
@@ -25268,7 +25342,7 @@
               <a:buChar char="●"/>
             </a:pPr>
             <a:r>
-              <a:rPr lang="en-GB" sz="2000" dirty="0">
+              <a:rPr lang="en-GB" sz="1600" dirty="0">
                 <a:solidFill>
                   <a:schemeClr val="accent1"/>
                 </a:solidFill>
@@ -25279,13 +25353,27 @@
               <a:t>Account Creation Script</a:t>
             </a:r>
             <a:r>
-              <a:rPr lang="en-GB" sz="2000" dirty="0">
+              <a:rPr lang="en-GB" sz="1600" dirty="0">
                 <a:solidFill>
                   <a:schemeClr val="dk1"/>
                 </a:solidFill>
               </a:rPr>
-              <a:t>: [Link to collector-account.js on GitHub]</a:t>
+              <a:t>: </a:t>
             </a:r>
+            <a:r>
+              <a:rPr lang="en-GB" sz="1600" dirty="0">
+                <a:solidFill>
+                  <a:schemeClr val="dk1"/>
+                </a:solidFill>
+                <a:hlinkClick r:id="rId9"/>
+              </a:rPr>
+              <a:t>https://github.com/commit-to-Noma/VeriCycle/blob/main/collector-account.js</a:t>
+            </a:r>
+            <a:endParaRPr lang="en-GB" sz="1600" dirty="0">
+              <a:solidFill>
+                <a:schemeClr val="dk1"/>
+              </a:solidFill>
+            </a:endParaRPr>
           </a:p>
           <a:p>
             <a:pPr marL="914400" lvl="0" indent="-304800" algn="l" rtl="0">
@@ -25303,7 +25391,7 @@
               <a:buChar char="●"/>
             </a:pPr>
             <a:r>
-              <a:rPr lang="en-GB" sz="2000" dirty="0">
+              <a:rPr lang="en-GB" sz="1600" dirty="0">
                 <a:solidFill>
                   <a:schemeClr val="accent1"/>
                 </a:solidFill>
@@ -25314,30 +25402,23 @@
               <a:t>Token Transfer Script</a:t>
             </a:r>
             <a:r>
-              <a:rPr lang="en-GB" sz="2000" dirty="0">
+              <a:rPr lang="en-GB" sz="1600" dirty="0">
                 <a:solidFill>
                   <a:schemeClr val="dk1"/>
                 </a:solidFill>
               </a:rPr>
-              <a:t>: [Link to transfer-reward.js on GitHub]</a:t>
+              <a:t>: </a:t>
             </a:r>
-          </a:p>
-          <a:p>
-            <a:pPr marL="914400" lvl="0" indent="-304800" algn="l" rtl="0">
-              <a:spcBef>
-                <a:spcPts val="0"/>
-              </a:spcBef>
-              <a:spcAft>
-                <a:spcPts val="0"/>
-              </a:spcAft>
-              <a:buClr>
-                <a:schemeClr val="accent1"/>
-              </a:buClr>
-              <a:buSzPts val="1200"/>
-              <a:buFont typeface="Zilla Slab"/>
-              <a:buChar char="●"/>
-            </a:pPr>
-            <a:endParaRPr sz="2000" dirty="0">
+            <a:r>
+              <a:rPr lang="en-GB" sz="1600" dirty="0">
+                <a:solidFill>
+                  <a:schemeClr val="dk1"/>
+                </a:solidFill>
+                <a:hlinkClick r:id="rId10"/>
+              </a:rPr>
+              <a:t>https://github.com/commit-to-Noma/VeriCycle/blob/main/transfer-reward.js</a:t>
+            </a:r>
+            <a:endParaRPr sz="1600" dirty="0">
               <a:solidFill>
                 <a:schemeClr val="dk1"/>
               </a:solidFill>
@@ -25471,6 +25552,274 @@
               </a:rPr>
               <a:t>.</a:t>
             </a:r>
+          </a:p>
+        </p:txBody>
+      </p:sp>
+      <p:sp>
+        <p:nvSpPr>
+          <p:cNvPr id="2" name="Rectangle 1">
+            <a:extLst>
+              <a:ext uri="{FF2B5EF4-FFF2-40B4-BE49-F238E27FC236}">
+                <a16:creationId xmlns:a16="http://schemas.microsoft.com/office/drawing/2014/main" id="{343C3824-8B21-DFF4-3595-9569096E50F8}"/>
+              </a:ext>
+            </a:extLst>
+          </p:cNvPr>
+          <p:cNvSpPr>
+            <a:spLocks noChangeArrowheads="1"/>
+          </p:cNvSpPr>
+          <p:nvPr/>
+        </p:nvSpPr>
+        <p:spPr bwMode="auto">
+          <a:xfrm>
+            <a:off x="0" y="0"/>
+            <a:ext cx="9144000" cy="0"/>
+          </a:xfrm>
+          <a:prstGeom prst="rect">
+            <a:avLst/>
+          </a:prstGeom>
+          <a:noFill/>
+          <a:ln>
+            <a:noFill/>
+          </a:ln>
+          <a:effectLst/>
+          <a:extLst>
+            <a:ext uri="{909E8E84-426E-40DD-AFC4-6F175D3DCCD1}">
+              <a14:hiddenFill xmlns:a14="http://schemas.microsoft.com/office/drawing/2010/main">
+                <a:solidFill>
+                  <a:schemeClr val="accent1"/>
+                </a:solidFill>
+              </a14:hiddenFill>
+            </a:ext>
+            <a:ext uri="{91240B29-F687-4F45-9708-019B960494DF}">
+              <a14:hiddenLine xmlns:a14="http://schemas.microsoft.com/office/drawing/2010/main" w="9525">
+                <a:solidFill>
+                  <a:schemeClr val="tx1"/>
+                </a:solidFill>
+                <a:miter lim="800000"/>
+                <a:headEnd/>
+                <a:tailEnd/>
+              </a14:hiddenLine>
+            </a:ext>
+            <a:ext uri="{AF507438-7753-43E0-B8FC-AC1667EBCBE1}">
+              <a14:hiddenEffects xmlns:a14="http://schemas.microsoft.com/office/drawing/2010/main">
+                <a:effectLst>
+                  <a:outerShdw dist="35921" dir="2700000" algn="ctr" rotWithShape="0">
+                    <a:schemeClr val="bg2"/>
+                  </a:outerShdw>
+                </a:effectLst>
+              </a14:hiddenEffects>
+            </a:ext>
+          </a:extLst>
+        </p:spPr>
+        <p:txBody>
+          <a:bodyPr vert="horz" wrap="none" lIns="91440" tIns="45720" rIns="91440" bIns="45720" numCol="1" anchor="ctr" anchorCtr="0" compatLnSpc="1">
+            <a:prstTxWarp prst="textNoShape">
+              <a:avLst/>
+            </a:prstTxWarp>
+            <a:spAutoFit/>
+          </a:bodyPr>
+          <a:lstStyle/>
+          <a:p>
+            <a:pPr marL="0" marR="0" lvl="0" indent="0" algn="l" defTabSz="914400" rtl="0" eaLnBrk="0" fontAlgn="base" latinLnBrk="0" hangingPunct="0">
+              <a:lnSpc>
+                <a:spcPct val="100000"/>
+              </a:lnSpc>
+              <a:spcBef>
+                <a:spcPct val="0"/>
+              </a:spcBef>
+              <a:spcAft>
+                <a:spcPct val="0"/>
+              </a:spcAft>
+              <a:buClrTx/>
+              <a:buSzTx/>
+              <a:buFontTx/>
+              <a:buChar char="•"/>
+              <a:tabLst/>
+            </a:pPr>
+            <a:r>
+              <a:rPr kumimoji="0" lang="en-US" altLang="en-US" sz="1000" b="0" i="0" u="none" strike="noStrike" cap="none" normalizeH="0" baseline="0">
+                <a:ln>
+                  <a:noFill/>
+                </a:ln>
+                <a:solidFill>
+                  <a:schemeClr val="tx1"/>
+                </a:solidFill>
+                <a:effectLst/>
+                <a:latin typeface="Arial Unicode MS"/>
+              </a:rPr>
+              <a:t>https://hashscan.io/testnet/token/0.0.7189125</a:t>
+            </a:r>
+            <a:endParaRPr kumimoji="0" lang="en-US" altLang="en-US" sz="600" b="0" i="0" u="none" strike="noStrike" cap="none" normalizeH="0" baseline="0">
+              <a:ln>
+                <a:noFill/>
+              </a:ln>
+              <a:solidFill>
+                <a:schemeClr val="tx1"/>
+              </a:solidFill>
+              <a:effectLst/>
+            </a:endParaRPr>
+          </a:p>
+          <a:p>
+            <a:pPr marL="0" marR="0" lvl="0" indent="0" algn="l" defTabSz="914400" rtl="0" eaLnBrk="0" fontAlgn="base" latinLnBrk="0" hangingPunct="0">
+              <a:lnSpc>
+                <a:spcPct val="100000"/>
+              </a:lnSpc>
+              <a:spcBef>
+                <a:spcPct val="0"/>
+              </a:spcBef>
+              <a:spcAft>
+                <a:spcPct val="0"/>
+              </a:spcAft>
+              <a:buClrTx/>
+              <a:buSzTx/>
+              <a:buFontTx/>
+              <a:buChar char="•"/>
+              <a:tabLst/>
+            </a:pPr>
+            <a:endParaRPr kumimoji="0" lang="en-US" altLang="en-US" sz="1800" b="0" i="0" u="none" strike="noStrike" cap="none" normalizeH="0" baseline="0">
+              <a:ln>
+                <a:noFill/>
+              </a:ln>
+              <a:solidFill>
+                <a:schemeClr val="tx1"/>
+              </a:solidFill>
+              <a:effectLst/>
+              <a:latin typeface="Arial" panose="020B0604020202020204" pitchFamily="34" charset="0"/>
+            </a:endParaRPr>
+          </a:p>
+        </p:txBody>
+      </p:sp>
+      <p:sp>
+        <p:nvSpPr>
+          <p:cNvPr id="3" name="Rectangle 2">
+            <a:extLst>
+              <a:ext uri="{FF2B5EF4-FFF2-40B4-BE49-F238E27FC236}">
+                <a16:creationId xmlns:a16="http://schemas.microsoft.com/office/drawing/2014/main" id="{0F6C6FEA-ECB6-4C5F-5F73-768067ACFA0B}"/>
+              </a:ext>
+            </a:extLst>
+          </p:cNvPr>
+          <p:cNvSpPr>
+            <a:spLocks noChangeArrowheads="1"/>
+          </p:cNvSpPr>
+          <p:nvPr/>
+        </p:nvSpPr>
+        <p:spPr bwMode="auto">
+          <a:xfrm>
+            <a:off x="152400" y="152400"/>
+            <a:ext cx="9144000" cy="0"/>
+          </a:xfrm>
+          <a:prstGeom prst="rect">
+            <a:avLst/>
+          </a:prstGeom>
+          <a:noFill/>
+          <a:ln>
+            <a:noFill/>
+          </a:ln>
+          <a:effectLst/>
+          <a:extLst>
+            <a:ext uri="{909E8E84-426E-40DD-AFC4-6F175D3DCCD1}">
+              <a14:hiddenFill xmlns:a14="http://schemas.microsoft.com/office/drawing/2010/main">
+                <a:solidFill>
+                  <a:schemeClr val="accent1"/>
+                </a:solidFill>
+              </a14:hiddenFill>
+            </a:ext>
+            <a:ext uri="{91240B29-F687-4F45-9708-019B960494DF}">
+              <a14:hiddenLine xmlns:a14="http://schemas.microsoft.com/office/drawing/2010/main" w="9525">
+                <a:solidFill>
+                  <a:schemeClr val="tx1"/>
+                </a:solidFill>
+                <a:miter lim="800000"/>
+                <a:headEnd/>
+                <a:tailEnd/>
+              </a14:hiddenLine>
+            </a:ext>
+            <a:ext uri="{AF507438-7753-43E0-B8FC-AC1667EBCBE1}">
+              <a14:hiddenEffects xmlns:a14="http://schemas.microsoft.com/office/drawing/2010/main">
+                <a:effectLst>
+                  <a:outerShdw dist="35921" dir="2700000" algn="ctr" rotWithShape="0">
+                    <a:schemeClr val="bg2"/>
+                  </a:outerShdw>
+                </a:effectLst>
+              </a14:hiddenEffects>
+            </a:ext>
+          </a:extLst>
+        </p:spPr>
+        <p:txBody>
+          <a:bodyPr vert="horz" wrap="none" lIns="91440" tIns="45720" rIns="91440" bIns="45720" numCol="1" anchor="ctr" anchorCtr="0" compatLnSpc="1">
+            <a:prstTxWarp prst="textNoShape">
+              <a:avLst/>
+            </a:prstTxWarp>
+            <a:spAutoFit/>
+          </a:bodyPr>
+          <a:lstStyle/>
+          <a:p>
+            <a:pPr marL="0" marR="0" lvl="0" indent="0" algn="l" defTabSz="914400" rtl="0" eaLnBrk="0" fontAlgn="base" latinLnBrk="0" hangingPunct="0">
+              <a:lnSpc>
+                <a:spcPct val="100000"/>
+              </a:lnSpc>
+              <a:spcBef>
+                <a:spcPct val="0"/>
+              </a:spcBef>
+              <a:spcAft>
+                <a:spcPct val="0"/>
+              </a:spcAft>
+              <a:buClrTx/>
+              <a:buSzTx/>
+              <a:buFontTx/>
+              <a:buChar char="•"/>
+              <a:tabLst/>
+            </a:pPr>
+            <a:r>
+              <a:rPr kumimoji="0" lang="en-US" altLang="en-US" sz="1000" b="0" i="0" u="none" strike="noStrike" cap="none" normalizeH="0" baseline="0">
+                <a:ln>
+                  <a:noFill/>
+                </a:ln>
+                <a:solidFill>
+                  <a:schemeClr val="tx1"/>
+                </a:solidFill>
+                <a:effectLst/>
+                <a:latin typeface="Arial Unicode MS"/>
+              </a:rPr>
+              <a:t>https://hashscan.io/testnet/token/0.0.7189125</a:t>
+            </a:r>
+            <a:endParaRPr kumimoji="0" lang="en-US" altLang="en-US" sz="600" b="0" i="0" u="none" strike="noStrike" cap="none" normalizeH="0" baseline="0">
+              <a:ln>
+                <a:noFill/>
+              </a:ln>
+              <a:solidFill>
+                <a:schemeClr val="tx1"/>
+              </a:solidFill>
+              <a:effectLst/>
+            </a:endParaRPr>
+          </a:p>
+          <a:p>
+            <a:pPr marL="0" marR="0" lvl="0" indent="0" algn="l" defTabSz="914400" rtl="0" eaLnBrk="0" fontAlgn="base" latinLnBrk="0" hangingPunct="0">
+              <a:lnSpc>
+                <a:spcPct val="100000"/>
+              </a:lnSpc>
+              <a:spcBef>
+                <a:spcPct val="0"/>
+              </a:spcBef>
+              <a:spcAft>
+                <a:spcPct val="0"/>
+              </a:spcAft>
+              <a:buClrTx/>
+              <a:buSzTx/>
+              <a:buFontTx/>
+              <a:buChar char="•"/>
+              <a:tabLst/>
+            </a:pPr>
+            <a:endParaRPr kumimoji="0" lang="en-US" altLang="en-US" sz="1800" b="0" i="0" u="none" strike="noStrike" cap="none" normalizeH="0" baseline="0">
+              <a:ln>
+                <a:noFill/>
+              </a:ln>
+              <a:solidFill>
+                <a:schemeClr val="tx1"/>
+              </a:solidFill>
+              <a:effectLst/>
+              <a:latin typeface="Arial" panose="020B0604020202020204" pitchFamily="34" charset="0"/>
+            </a:endParaRPr>
           </a:p>
         </p:txBody>
       </p:sp>

</xml_diff>

<commit_message>
feat: add Dockerfile for application setup with Python and Node.js dependencies
</commit_message>
<xml_diff>
--- a/Vericycle Pitch Deck.pptx
+++ b/Vericycle Pitch Deck.pptx
@@ -5,7 +5,7 @@
     <p:sldMasterId id="2147483678" r:id="rId1"/>
   </p:sldMasterIdLst>
   <p:notesMasterIdLst>
-    <p:notesMasterId r:id="rId13"/>
+    <p:notesMasterId r:id="rId14"/>
   </p:notesMasterIdLst>
   <p:sldIdLst>
     <p:sldId id="256" r:id="rId2"/>
@@ -16,38 +16,39 @@
     <p:sldId id="261" r:id="rId7"/>
     <p:sldId id="318" r:id="rId8"/>
     <p:sldId id="279" r:id="rId9"/>
-    <p:sldId id="321" r:id="rId10"/>
-    <p:sldId id="322" r:id="rId11"/>
-    <p:sldId id="323" r:id="rId12"/>
+    <p:sldId id="324" r:id="rId10"/>
+    <p:sldId id="321" r:id="rId11"/>
+    <p:sldId id="322" r:id="rId12"/>
+    <p:sldId id="323" r:id="rId13"/>
   </p:sldIdLst>
   <p:sldSz cx="9144000" cy="5143500" type="screen16x9"/>
   <p:notesSz cx="6858000" cy="9144000"/>
   <p:embeddedFontLst>
     <p:embeddedFont>
       <p:font typeface="Advent Pro SemiBold" panose="020B0604020202020204" charset="0"/>
-      <p:regular r:id="rId14"/>
-      <p:bold r:id="rId15"/>
-      <p:italic r:id="rId16"/>
-      <p:boldItalic r:id="rId17"/>
+      <p:regular r:id="rId15"/>
+      <p:bold r:id="rId16"/>
+      <p:italic r:id="rId17"/>
+      <p:boldItalic r:id="rId18"/>
     </p:embeddedFont>
     <p:embeddedFont>
       <p:font typeface="Alfa Slab One" panose="020B0604020202020204" charset="0"/>
-      <p:regular r:id="rId18"/>
+      <p:regular r:id="rId19"/>
     </p:embeddedFont>
     <p:embeddedFont>
       <p:font typeface="Fira Sans Extra Condensed Medium" panose="020B0604020202020204" charset="0"/>
-      <p:regular r:id="rId19"/>
-      <p:bold r:id="rId20"/>
-      <p:italic r:id="rId21"/>
-      <p:boldItalic r:id="rId22"/>
+      <p:regular r:id="rId20"/>
+      <p:bold r:id="rId21"/>
+      <p:italic r:id="rId22"/>
+      <p:boldItalic r:id="rId23"/>
     </p:embeddedFont>
     <p:embeddedFont>
       <p:font typeface="Squada One" panose="020B0604020202020204" charset="0"/>
-      <p:regular r:id="rId23"/>
+      <p:regular r:id="rId24"/>
     </p:embeddedFont>
     <p:embeddedFont>
       <p:font typeface="Wellfleet" panose="020B0604020202020204" charset="0"/>
-      <p:regular r:id="rId24"/>
+      <p:regular r:id="rId25"/>
     </p:embeddedFont>
   </p:embeddedFontLst>
   <p:defaultTextStyle>
@@ -290,7 +291,7 @@
 <file path=ppt/revisionInfo.xml><?xml version="1.0" encoding="utf-8"?>
 <p1510:revInfo xmlns:a="http://schemas.openxmlformats.org/drawingml/2006/main" xmlns:r="http://schemas.openxmlformats.org/officeDocument/2006/relationships" xmlns:p1510="http://schemas.microsoft.com/office/powerpoint/2015/10/main">
   <p1510:revLst>
-    <p1510:client id="{BADD8881-CF52-44A3-AC4A-94C3126486E0}" v="12" dt="2025-11-15T19:45:41.680"/>
+    <p1510:client id="{BADD8881-CF52-44A3-AC4A-94C3126486E0}" v="33" dt="2025-11-21T20:21:29.556"/>
   </p1510:revLst>
 </p1510:revInfo>
 </file>
@@ -299,19 +300,27 @@
 <pc:chgInfo xmlns:a="http://schemas.openxmlformats.org/drawingml/2006/main" xmlns:r="http://schemas.openxmlformats.org/officeDocument/2006/relationships" xmlns:ac="http://schemas.microsoft.com/office/drawing/2013/main/command" xmlns:pc="http://schemas.microsoft.com/office/powerpoint/2013/main/command">
   <pc:docChgLst>
     <pc:chgData name="Noma Ncube" userId="c5bd3073de45acf7" providerId="LiveId" clId="{94FB0B1B-DAC1-4DF4-852D-A426A8D32563}"/>
-    <pc:docChg chg="undo custSel modSld">
-      <pc:chgData name="Noma Ncube" userId="c5bd3073de45acf7" providerId="LiveId" clId="{94FB0B1B-DAC1-4DF4-852D-A426A8D32563}" dt="2025-11-15T19:45:31.575" v="82" actId="20577"/>
+    <pc:docChg chg="undo custSel addSld modSld sldOrd">
+      <pc:chgData name="Noma Ncube" userId="c5bd3073de45acf7" providerId="LiveId" clId="{94FB0B1B-DAC1-4DF4-852D-A426A8D32563}" dt="2025-11-21T20:34:19.077" v="343"/>
       <pc:docMkLst>
         <pc:docMk/>
       </pc:docMkLst>
       <pc:sldChg chg="modSp mod">
-        <pc:chgData name="Noma Ncube" userId="c5bd3073de45acf7" providerId="LiveId" clId="{94FB0B1B-DAC1-4DF4-852D-A426A8D32563}" dt="2025-11-15T18:15:17.007" v="2" actId="13926"/>
+        <pc:chgData name="Noma Ncube" userId="c5bd3073de45acf7" providerId="LiveId" clId="{94FB0B1B-DAC1-4DF4-852D-A426A8D32563}" dt="2025-11-21T20:20:26.970" v="242" actId="108"/>
         <pc:sldMkLst>
           <pc:docMk/>
           <pc:sldMk cId="0" sldId="279"/>
         </pc:sldMkLst>
         <pc:spChg chg="mod">
-          <ac:chgData name="Noma Ncube" userId="c5bd3073de45acf7" providerId="LiveId" clId="{94FB0B1B-DAC1-4DF4-852D-A426A8D32563}" dt="2025-11-15T18:15:17.007" v="2" actId="13926"/>
+          <ac:chgData name="Noma Ncube" userId="c5bd3073de45acf7" providerId="LiveId" clId="{94FB0B1B-DAC1-4DF4-852D-A426A8D32563}" dt="2025-11-21T20:01:36.606" v="96" actId="1076"/>
+          <ac:spMkLst>
+            <pc:docMk/>
+            <pc:sldMk cId="0" sldId="279"/>
+            <ac:spMk id="16" creationId="{21078CFF-C68A-D1AA-FBED-412F9146844E}"/>
+          </ac:spMkLst>
+        </pc:spChg>
+        <pc:spChg chg="mod">
+          <ac:chgData name="Noma Ncube" userId="c5bd3073de45acf7" providerId="LiveId" clId="{94FB0B1B-DAC1-4DF4-852D-A426A8D32563}" dt="2025-11-21T20:20:26.970" v="242" actId="108"/>
           <ac:spMkLst>
             <pc:docMk/>
             <pc:sldMk cId="0" sldId="279"/>
@@ -319,8 +328,68 @@
           </ac:spMkLst>
         </pc:spChg>
       </pc:sldChg>
+      <pc:sldChg chg="modSp mod">
+        <pc:chgData name="Noma Ncube" userId="c5bd3073de45acf7" providerId="LiveId" clId="{94FB0B1B-DAC1-4DF4-852D-A426A8D32563}" dt="2025-11-21T20:08:48.271" v="104" actId="122"/>
+        <pc:sldMkLst>
+          <pc:docMk/>
+          <pc:sldMk cId="2510812949" sldId="314"/>
+        </pc:sldMkLst>
+        <pc:spChg chg="mod">
+          <ac:chgData name="Noma Ncube" userId="c5bd3073de45acf7" providerId="LiveId" clId="{94FB0B1B-DAC1-4DF4-852D-A426A8D32563}" dt="2025-11-21T20:08:48.271" v="104" actId="122"/>
+          <ac:spMkLst>
+            <pc:docMk/>
+            <pc:sldMk cId="2510812949" sldId="314"/>
+            <ac:spMk id="2" creationId="{E969DC7E-CC3E-3AD3-EECF-D5BB5DBA1B89}"/>
+          </ac:spMkLst>
+        </pc:spChg>
+      </pc:sldChg>
+      <pc:sldChg chg="modSp mod">
+        <pc:chgData name="Noma Ncube" userId="c5bd3073de45acf7" providerId="LiveId" clId="{94FB0B1B-DAC1-4DF4-852D-A426A8D32563}" dt="2025-11-21T20:18:18.392" v="212" actId="20577"/>
+        <pc:sldMkLst>
+          <pc:docMk/>
+          <pc:sldMk cId="387178372" sldId="315"/>
+        </pc:sldMkLst>
+        <pc:spChg chg="mod">
+          <ac:chgData name="Noma Ncube" userId="c5bd3073de45acf7" providerId="LiveId" clId="{94FB0B1B-DAC1-4DF4-852D-A426A8D32563}" dt="2025-11-21T20:18:18.392" v="212" actId="20577"/>
+          <ac:spMkLst>
+            <pc:docMk/>
+            <pc:sldMk cId="387178372" sldId="315"/>
+            <ac:spMk id="688" creationId="{BAC4EDC5-6E0A-3CA3-74B9-6FE2E5B86612}"/>
+          </ac:spMkLst>
+        </pc:spChg>
+      </pc:sldChg>
+      <pc:sldChg chg="modSp mod">
+        <pc:chgData name="Noma Ncube" userId="c5bd3073de45acf7" providerId="LiveId" clId="{94FB0B1B-DAC1-4DF4-852D-A426A8D32563}" dt="2025-11-21T20:34:19.077" v="343"/>
+        <pc:sldMkLst>
+          <pc:docMk/>
+          <pc:sldMk cId="701395597" sldId="318"/>
+        </pc:sldMkLst>
+        <pc:spChg chg="mod">
+          <ac:chgData name="Noma Ncube" userId="c5bd3073de45acf7" providerId="LiveId" clId="{94FB0B1B-DAC1-4DF4-852D-A426A8D32563}" dt="2025-11-21T20:34:19.077" v="343"/>
+          <ac:spMkLst>
+            <pc:docMk/>
+            <pc:sldMk cId="701395597" sldId="318"/>
+            <ac:spMk id="728" creationId="{2F8A9529-7A70-00D9-2FBB-ED650D42108D}"/>
+          </ac:spMkLst>
+        </pc:spChg>
+      </pc:sldChg>
+      <pc:sldChg chg="modSp mod">
+        <pc:chgData name="Noma Ncube" userId="c5bd3073de45acf7" providerId="LiveId" clId="{94FB0B1B-DAC1-4DF4-852D-A426A8D32563}" dt="2025-11-21T20:31:49.047" v="330" actId="108"/>
+        <pc:sldMkLst>
+          <pc:docMk/>
+          <pc:sldMk cId="3346341612" sldId="321"/>
+        </pc:sldMkLst>
+        <pc:spChg chg="mod">
+          <ac:chgData name="Noma Ncube" userId="c5bd3073de45acf7" providerId="LiveId" clId="{94FB0B1B-DAC1-4DF4-852D-A426A8D32563}" dt="2025-11-21T20:31:49.047" v="330" actId="108"/>
+          <ac:spMkLst>
+            <pc:docMk/>
+            <pc:sldMk cId="3346341612" sldId="321"/>
+            <ac:spMk id="676" creationId="{BEABEEE1-7859-AABB-8258-C882F74501F5}"/>
+          </ac:spMkLst>
+        </pc:spChg>
+      </pc:sldChg>
       <pc:sldChg chg="addSp modSp mod">
-        <pc:chgData name="Noma Ncube" userId="c5bd3073de45acf7" providerId="LiveId" clId="{94FB0B1B-DAC1-4DF4-852D-A426A8D32563}" dt="2025-11-15T19:45:31.575" v="82" actId="20577"/>
+        <pc:chgData name="Noma Ncube" userId="c5bd3073de45acf7" providerId="LiveId" clId="{94FB0B1B-DAC1-4DF4-852D-A426A8D32563}" dt="2025-11-21T19:37:48.485" v="91" actId="20577"/>
         <pc:sldMkLst>
           <pc:docMk/>
           <pc:sldMk cId="3907859258" sldId="322"/>
@@ -342,11 +411,50 @@
           </ac:spMkLst>
         </pc:spChg>
         <pc:spChg chg="mod">
-          <ac:chgData name="Noma Ncube" userId="c5bd3073de45acf7" providerId="LiveId" clId="{94FB0B1B-DAC1-4DF4-852D-A426A8D32563}" dt="2025-11-15T19:45:31.575" v="82" actId="20577"/>
+          <ac:chgData name="Noma Ncube" userId="c5bd3073de45acf7" providerId="LiveId" clId="{94FB0B1B-DAC1-4DF4-852D-A426A8D32563}" dt="2025-11-21T19:37:48.485" v="91" actId="20577"/>
           <ac:spMkLst>
             <pc:docMk/>
             <pc:sldMk cId="3907859258" sldId="322"/>
             <ac:spMk id="676" creationId="{F0DE0544-F81C-D71C-B2F9-2C932DB63758}"/>
+          </ac:spMkLst>
+        </pc:spChg>
+      </pc:sldChg>
+      <pc:sldChg chg="addSp delSp modSp add mod ord">
+        <pc:chgData name="Noma Ncube" userId="c5bd3073de45acf7" providerId="LiveId" clId="{94FB0B1B-DAC1-4DF4-852D-A426A8D32563}" dt="2025-11-21T20:33:05.174" v="334"/>
+        <pc:sldMkLst>
+          <pc:docMk/>
+          <pc:sldMk cId="3544684066" sldId="324"/>
+        </pc:sldMkLst>
+        <pc:spChg chg="add">
+          <ac:chgData name="Noma Ncube" userId="c5bd3073de45acf7" providerId="LiveId" clId="{94FB0B1B-DAC1-4DF4-852D-A426A8D32563}" dt="2025-11-21T20:15:06.683" v="173"/>
+          <ac:spMkLst>
+            <pc:docMk/>
+            <pc:sldMk cId="3544684066" sldId="324"/>
+            <ac:spMk id="2" creationId="{D8382377-64ED-72B6-A104-4512581AA420}"/>
+          </ac:spMkLst>
+        </pc:spChg>
+        <pc:spChg chg="del mod">
+          <ac:chgData name="Noma Ncube" userId="c5bd3073de45acf7" providerId="LiveId" clId="{94FB0B1B-DAC1-4DF4-852D-A426A8D32563}" dt="2025-11-21T20:33:05.174" v="334"/>
+          <ac:spMkLst>
+            <pc:docMk/>
+            <pc:sldMk cId="3544684066" sldId="324"/>
+            <ac:spMk id="5" creationId="{0B95ADFE-CBBC-B395-DFC1-062D6ED8F0C1}"/>
+          </ac:spMkLst>
+        </pc:spChg>
+        <pc:spChg chg="mod">
+          <ac:chgData name="Noma Ncube" userId="c5bd3073de45acf7" providerId="LiveId" clId="{94FB0B1B-DAC1-4DF4-852D-A426A8D32563}" dt="2025-11-21T20:30:56.795" v="322" actId="1076"/>
+          <ac:spMkLst>
+            <pc:docMk/>
+            <pc:sldMk cId="3544684066" sldId="324"/>
+            <ac:spMk id="675" creationId="{3AB3CBCF-58DA-2D1C-B7DB-780D7C729FD0}"/>
+          </ac:spMkLst>
+        </pc:spChg>
+        <pc:spChg chg="mod">
+          <ac:chgData name="Noma Ncube" userId="c5bd3073de45acf7" providerId="LiveId" clId="{94FB0B1B-DAC1-4DF4-852D-A426A8D32563}" dt="2025-11-21T20:30:44.114" v="321" actId="1076"/>
+          <ac:spMkLst>
+            <pc:docMk/>
+            <pc:sldMk cId="3544684066" sldId="324"/>
+            <ac:spMk id="676" creationId="{5893D2C8-C7F9-3939-6160-9AC8A8291EDA}"/>
           </ac:spMkLst>
         </pc:spChg>
       </pc:sldChg>
@@ -922,6 +1030,140 @@
         <p:cNvPr id="1" name="Shape 671">
           <a:extLst>
             <a:ext uri="{FF2B5EF4-FFF2-40B4-BE49-F238E27FC236}">
+              <a16:creationId xmlns:a16="http://schemas.microsoft.com/office/drawing/2014/main" id="{E6B2D13A-5A45-159C-0BF0-056E5D18C4B6}"/>
+            </a:ext>
+          </a:extLst>
+        </p:cNvPr>
+        <p:cNvGrpSpPr/>
+        <p:nvPr/>
+      </p:nvGrpSpPr>
+      <p:grpSpPr>
+        <a:xfrm>
+          <a:off x="0" y="0"/>
+          <a:ext cx="0" cy="0"/>
+          <a:chOff x="0" y="0"/>
+          <a:chExt cx="0" cy="0"/>
+        </a:xfrm>
+      </p:grpSpPr>
+      <p:sp>
+        <p:nvSpPr>
+          <p:cNvPr id="672" name="Google Shape;672;g1105dd86f9e_0_592:notes">
+            <a:extLst>
+              <a:ext uri="{FF2B5EF4-FFF2-40B4-BE49-F238E27FC236}">
+                <a16:creationId xmlns:a16="http://schemas.microsoft.com/office/drawing/2014/main" id="{7838DD25-61FB-A314-CD23-3EA54F9B72B0}"/>
+              </a:ext>
+            </a:extLst>
+          </p:cNvPr>
+          <p:cNvSpPr>
+            <a:spLocks noGrp="1" noRot="1" noChangeAspect="1"/>
+          </p:cNvSpPr>
+          <p:nvPr>
+            <p:ph type="sldImg" idx="2"/>
+          </p:nvPr>
+        </p:nvSpPr>
+        <p:spPr>
+          <a:xfrm>
+            <a:off x="381000" y="685800"/>
+            <a:ext cx="6096000" cy="3429000"/>
+          </a:xfrm>
+          <a:custGeom>
+            <a:avLst/>
+            <a:gdLst/>
+            <a:ahLst/>
+            <a:cxnLst/>
+            <a:rect l="l" t="t" r="r" b="b"/>
+            <a:pathLst>
+              <a:path w="120000" h="120000" extrusionOk="0">
+                <a:moveTo>
+                  <a:pt x="0" y="0"/>
+                </a:moveTo>
+                <a:lnTo>
+                  <a:pt x="120000" y="0"/>
+                </a:lnTo>
+                <a:lnTo>
+                  <a:pt x="120000" y="120000"/>
+                </a:lnTo>
+                <a:lnTo>
+                  <a:pt x="0" y="120000"/>
+                </a:lnTo>
+                <a:close/>
+              </a:path>
+            </a:pathLst>
+          </a:custGeom>
+        </p:spPr>
+        <p:txBody>
+          <a:bodyPr/>
+          <a:lstStyle/>
+          <a:p>
+            <a:endParaRPr lang="en-ZA"/>
+          </a:p>
+        </p:txBody>
+      </p:sp>
+      <p:sp>
+        <p:nvSpPr>
+          <p:cNvPr id="673" name="Google Shape;673;g1105dd86f9e_0_592:notes">
+            <a:extLst>
+              <a:ext uri="{FF2B5EF4-FFF2-40B4-BE49-F238E27FC236}">
+                <a16:creationId xmlns:a16="http://schemas.microsoft.com/office/drawing/2014/main" id="{90B31627-31C3-119C-831B-AEF8900F744D}"/>
+              </a:ext>
+            </a:extLst>
+          </p:cNvPr>
+          <p:cNvSpPr txBox="1">
+            <a:spLocks noGrp="1"/>
+          </p:cNvSpPr>
+          <p:nvPr>
+            <p:ph type="body" idx="1"/>
+          </p:nvPr>
+        </p:nvSpPr>
+        <p:spPr>
+          <a:xfrm>
+            <a:off x="685800" y="4343400"/>
+            <a:ext cx="5486400" cy="4114800"/>
+          </a:xfrm>
+          <a:prstGeom prst="rect">
+            <a:avLst/>
+          </a:prstGeom>
+        </p:spPr>
+        <p:txBody>
+          <a:bodyPr spcFirstLastPara="1" wrap="square" lIns="91425" tIns="91425" rIns="91425" bIns="91425" anchor="t" anchorCtr="0">
+            <a:noAutofit/>
+          </a:bodyPr>
+          <a:lstStyle/>
+          <a:p>
+            <a:pPr marL="0" lvl="0" indent="0" algn="l" rtl="0">
+              <a:spcBef>
+                <a:spcPts val="0"/>
+              </a:spcBef>
+              <a:spcAft>
+                <a:spcPts val="0"/>
+              </a:spcAft>
+              <a:buNone/>
+            </a:pPr>
+            <a:endParaRPr/>
+          </a:p>
+        </p:txBody>
+      </p:sp>
+    </p:spTree>
+    <p:extLst>
+      <p:ext uri="{BB962C8B-B14F-4D97-AF65-F5344CB8AC3E}">
+        <p14:creationId xmlns:p14="http://schemas.microsoft.com/office/powerpoint/2010/main" val="3930679233"/>
+      </p:ext>
+    </p:extLst>
+  </p:cSld>
+  <p:clrMapOvr>
+    <a:masterClrMapping/>
+  </p:clrMapOvr>
+</p:notes>
+</file>
+
+<file path=ppt/notesSlides/notesSlide11.xml><?xml version="1.0" encoding="utf-8"?>
+<p:notes xmlns:a="http://schemas.openxmlformats.org/drawingml/2006/main" xmlns:r="http://schemas.openxmlformats.org/officeDocument/2006/relationships" xmlns:p="http://schemas.openxmlformats.org/presentationml/2006/main" showMasterSp="0" showMasterPhAnim="0">
+  <p:cSld>
+    <p:spTree>
+      <p:nvGrpSpPr>
+        <p:cNvPr id="1" name="Shape 671">
+          <a:extLst>
+            <a:ext uri="{FF2B5EF4-FFF2-40B4-BE49-F238E27FC236}">
               <a16:creationId xmlns:a16="http://schemas.microsoft.com/office/drawing/2014/main" id="{E12B3594-0CC6-99DD-1587-9B439D36A729}"/>
             </a:ext>
           </a:extLst>
@@ -1048,7 +1290,7 @@
 </p:notes>
 </file>
 
-<file path=ppt/notesSlides/notesSlide11.xml><?xml version="1.0" encoding="utf-8"?>
+<file path=ppt/notesSlides/notesSlide12.xml><?xml version="1.0" encoding="utf-8"?>
 <p:notes xmlns:a="http://schemas.openxmlformats.org/drawingml/2006/main" xmlns:r="http://schemas.openxmlformats.org/officeDocument/2006/relationships" xmlns:p="http://schemas.openxmlformats.org/presentationml/2006/main">
   <p:cSld>
     <p:spTree>
@@ -1998,7 +2240,7 @@
         <p:cNvPr id="1" name="Shape 671">
           <a:extLst>
             <a:ext uri="{FF2B5EF4-FFF2-40B4-BE49-F238E27FC236}">
-              <a16:creationId xmlns:a16="http://schemas.microsoft.com/office/drawing/2014/main" id="{E6B2D13A-5A45-159C-0BF0-056E5D18C4B6}"/>
+              <a16:creationId xmlns:a16="http://schemas.microsoft.com/office/drawing/2014/main" id="{43771628-E95D-B5FF-ECC8-D3F37B38F3F8}"/>
             </a:ext>
           </a:extLst>
         </p:cNvPr>
@@ -2018,7 +2260,7 @@
           <p:cNvPr id="672" name="Google Shape;672;g1105dd86f9e_0_592:notes">
             <a:extLst>
               <a:ext uri="{FF2B5EF4-FFF2-40B4-BE49-F238E27FC236}">
-                <a16:creationId xmlns:a16="http://schemas.microsoft.com/office/drawing/2014/main" id="{7838DD25-61FB-A314-CD23-3EA54F9B72B0}"/>
+                <a16:creationId xmlns:a16="http://schemas.microsoft.com/office/drawing/2014/main" id="{7A2692FA-060B-0DDD-8869-FACEA9D6D724}"/>
               </a:ext>
             </a:extLst>
           </p:cNvPr>
@@ -2072,7 +2314,7 @@
           <p:cNvPr id="673" name="Google Shape;673;g1105dd86f9e_0_592:notes">
             <a:extLst>
               <a:ext uri="{FF2B5EF4-FFF2-40B4-BE49-F238E27FC236}">
-                <a16:creationId xmlns:a16="http://schemas.microsoft.com/office/drawing/2014/main" id="{90B31627-31C3-119C-831B-AEF8900F744D}"/>
+                <a16:creationId xmlns:a16="http://schemas.microsoft.com/office/drawing/2014/main" id="{8895BDD0-4D85-F5A9-6DF4-6B22379E33E5}"/>
               </a:ext>
             </a:extLst>
           </p:cNvPr>
@@ -2114,7 +2356,7 @@
     </p:spTree>
     <p:extLst>
       <p:ext uri="{BB962C8B-B14F-4D97-AF65-F5344CB8AC3E}">
-        <p14:creationId xmlns:p14="http://schemas.microsoft.com/office/powerpoint/2010/main" val="3930679233"/>
+        <p14:creationId xmlns:p14="http://schemas.microsoft.com/office/powerpoint/2010/main" val="2562099464"/>
       </p:ext>
     </p:extLst>
   </p:cSld>
@@ -24928,6 +25170,380 @@
         <p:cNvPr id="1" name="Shape 674">
           <a:extLst>
             <a:ext uri="{FF2B5EF4-FFF2-40B4-BE49-F238E27FC236}">
+              <a16:creationId xmlns:a16="http://schemas.microsoft.com/office/drawing/2014/main" id="{F7CDCD18-B0F1-BA9F-DEC5-6B8E09801327}"/>
+            </a:ext>
+          </a:extLst>
+        </p:cNvPr>
+        <p:cNvGrpSpPr/>
+        <p:nvPr/>
+      </p:nvGrpSpPr>
+      <p:grpSpPr>
+        <a:xfrm>
+          <a:off x="0" y="0"/>
+          <a:ext cx="0" cy="0"/>
+          <a:chOff x="0" y="0"/>
+          <a:chExt cx="0" cy="0"/>
+        </a:xfrm>
+      </p:grpSpPr>
+      <p:sp>
+        <p:nvSpPr>
+          <p:cNvPr id="675" name="Google Shape;675;p34">
+            <a:extLst>
+              <a:ext uri="{FF2B5EF4-FFF2-40B4-BE49-F238E27FC236}">
+                <a16:creationId xmlns:a16="http://schemas.microsoft.com/office/drawing/2014/main" id="{D1660E3F-31E4-C001-44F0-BE3772CC8982}"/>
+              </a:ext>
+            </a:extLst>
+          </p:cNvPr>
+          <p:cNvSpPr txBox="1">
+            <a:spLocks noGrp="1"/>
+          </p:cNvSpPr>
+          <p:nvPr>
+            <p:ph type="title"/>
+          </p:nvPr>
+        </p:nvSpPr>
+        <p:spPr>
+          <a:xfrm>
+            <a:off x="264267" y="624150"/>
+            <a:ext cx="8615315" cy="572700"/>
+          </a:xfrm>
+          <a:prstGeom prst="rect">
+            <a:avLst/>
+          </a:prstGeom>
+        </p:spPr>
+        <p:txBody>
+          <a:bodyPr spcFirstLastPara="1" wrap="square" lIns="91425" tIns="91425" rIns="91425" bIns="91425" anchor="ctr" anchorCtr="0">
+            <a:noAutofit/>
+          </a:bodyPr>
+          <a:lstStyle/>
+          <a:p>
+            <a:pPr marL="0" lvl="0" indent="0" algn="ctr" rtl="0">
+              <a:spcBef>
+                <a:spcPts val="0"/>
+              </a:spcBef>
+              <a:spcAft>
+                <a:spcPts val="0"/>
+              </a:spcAft>
+              <a:buNone/>
+            </a:pPr>
+            <a:r>
+              <a:rPr lang="en-GB" sz="3800" dirty="0"/>
+              <a:t>A Global Blueprint for Incentivized Recycling</a:t>
+            </a:r>
+            <a:endParaRPr sz="3800" dirty="0"/>
+          </a:p>
+        </p:txBody>
+      </p:sp>
+      <p:sp>
+        <p:nvSpPr>
+          <p:cNvPr id="676" name="Google Shape;676;p34">
+            <a:extLst>
+              <a:ext uri="{FF2B5EF4-FFF2-40B4-BE49-F238E27FC236}">
+                <a16:creationId xmlns:a16="http://schemas.microsoft.com/office/drawing/2014/main" id="{BEABEEE1-7859-AABB-8258-C882F74501F5}"/>
+              </a:ext>
+            </a:extLst>
+          </p:cNvPr>
+          <p:cNvSpPr txBox="1">
+            <a:spLocks noGrp="1"/>
+          </p:cNvSpPr>
+          <p:nvPr>
+            <p:ph type="body" idx="1"/>
+          </p:nvPr>
+        </p:nvSpPr>
+        <p:spPr>
+          <a:xfrm>
+            <a:off x="726576" y="1769550"/>
+            <a:ext cx="7385713" cy="2940898"/>
+          </a:xfrm>
+          <a:prstGeom prst="rect">
+            <a:avLst/>
+          </a:prstGeom>
+        </p:spPr>
+        <p:txBody>
+          <a:bodyPr spcFirstLastPara="1" wrap="square" lIns="91425" tIns="91425" rIns="91425" bIns="91425" anchor="ctr" anchorCtr="0">
+            <a:noAutofit/>
+          </a:bodyPr>
+          <a:lstStyle/>
+          <a:p>
+            <a:pPr marL="914400" lvl="0" indent="-304800" algn="l" rtl="0">
+              <a:spcBef>
+                <a:spcPts val="0"/>
+              </a:spcBef>
+              <a:spcAft>
+                <a:spcPts val="0"/>
+              </a:spcAft>
+              <a:buClr>
+                <a:schemeClr val="accent1"/>
+              </a:buClr>
+              <a:buSzPts val="1200"/>
+              <a:buFont typeface="Zilla Slab"/>
+              <a:buChar char="●"/>
+            </a:pPr>
+            <a:r>
+              <a:rPr lang="en-GB" sz="1900" b="1" dirty="0">
+                <a:solidFill>
+                  <a:schemeClr val="dk1"/>
+                </a:solidFill>
+              </a:rPr>
+              <a:t>It's for Everyone</a:t>
+            </a:r>
+            <a:r>
+              <a:rPr lang="en-GB" sz="1900" dirty="0">
+                <a:solidFill>
+                  <a:schemeClr val="dk1"/>
+                </a:solidFill>
+              </a:rPr>
+              <a:t>: VeriCycle's model is a universal incentive. It empowers </a:t>
+            </a:r>
+            <a:r>
+              <a:rPr lang="en-GB" sz="1900" dirty="0">
+                <a:solidFill>
+                  <a:schemeClr val="accent1"/>
+                </a:solidFill>
+                <a:uFill>
+                  <a:noFill/>
+                </a:uFill>
+              </a:rPr>
+              <a:t>informal collectors </a:t>
+            </a:r>
+            <a:r>
+              <a:rPr lang="en-GB" sz="1900" dirty="0">
+                <a:solidFill>
+                  <a:schemeClr val="dk1"/>
+                </a:solidFill>
+              </a:rPr>
+              <a:t>who do this for a living, but it also rewards </a:t>
+            </a:r>
+            <a:r>
+              <a:rPr lang="en-GB" sz="1900" dirty="0">
+                <a:solidFill>
+                  <a:schemeClr val="accent1"/>
+                </a:solidFill>
+                <a:uFill>
+                  <a:noFill/>
+                </a:uFill>
+              </a:rPr>
+              <a:t>formal households </a:t>
+            </a:r>
+            <a:r>
+              <a:rPr lang="en-GB" sz="1900" dirty="0">
+                <a:solidFill>
+                  <a:schemeClr val="dk1"/>
+                </a:solidFill>
+              </a:rPr>
+              <a:t>who already recycle and </a:t>
+            </a:r>
+            <a:r>
+              <a:rPr lang="en-GB" sz="1900" dirty="0">
+                <a:solidFill>
+                  <a:schemeClr val="accent1"/>
+                </a:solidFill>
+                <a:uFill>
+                  <a:noFill/>
+                </a:uFill>
+              </a:rPr>
+              <a:t>encourages new people </a:t>
+            </a:r>
+            <a:r>
+              <a:rPr lang="en-GB" sz="1900" dirty="0">
+                <a:solidFill>
+                  <a:schemeClr val="dk1"/>
+                </a:solidFill>
+              </a:rPr>
+              <a:t>to start.</a:t>
+            </a:r>
+          </a:p>
+          <a:p>
+            <a:pPr marL="914400" lvl="0" indent="-304800" algn="l" rtl="0">
+              <a:spcBef>
+                <a:spcPts val="0"/>
+              </a:spcBef>
+              <a:spcAft>
+                <a:spcPts val="0"/>
+              </a:spcAft>
+              <a:buClr>
+                <a:schemeClr val="accent1"/>
+              </a:buClr>
+              <a:buSzPts val="1200"/>
+              <a:buFont typeface="Zilla Slab"/>
+              <a:buChar char="●"/>
+            </a:pPr>
+            <a:r>
+              <a:rPr lang="en-GB" sz="1900" b="1" dirty="0">
+                <a:solidFill>
+                  <a:schemeClr val="dk1"/>
+                </a:solidFill>
+              </a:rPr>
+              <a:t>The Model is Universal</a:t>
+            </a:r>
+            <a:r>
+              <a:rPr lang="en-GB" sz="1900" dirty="0">
+                <a:solidFill>
+                  <a:schemeClr val="dk1"/>
+                </a:solidFill>
+              </a:rPr>
+              <a:t>: The problem of "incentive vs. convenience" is global. Our Hedera-based blueprint—a trusted, low-cost, verifiable rewards system—can be deployed in any city worldwide.</a:t>
+            </a:r>
+          </a:p>
+          <a:p>
+            <a:pPr marL="914400" lvl="0" indent="-304800" algn="l" rtl="0">
+              <a:spcBef>
+                <a:spcPts val="0"/>
+              </a:spcBef>
+              <a:spcAft>
+                <a:spcPts val="0"/>
+              </a:spcAft>
+              <a:buClr>
+                <a:schemeClr val="accent1"/>
+              </a:buClr>
+              <a:buSzPts val="1200"/>
+              <a:buFont typeface="Zilla Slab"/>
+              <a:buChar char="●"/>
+            </a:pPr>
+            <a:r>
+              <a:rPr lang="en-GB" sz="1900" dirty="0">
+                <a:solidFill>
+                  <a:schemeClr val="dk1"/>
+                </a:solidFill>
+              </a:rPr>
+              <a:t>Network Impact: Recycling is high-frequency. 90,000 Users x 5 Daily Drops = </a:t>
+            </a:r>
+            <a:r>
+              <a:rPr lang="en-GB" sz="1900" dirty="0">
+                <a:solidFill>
+                  <a:schemeClr val="accent1"/>
+                </a:solidFill>
+                <a:uFill>
+                  <a:noFill/>
+                </a:uFill>
+              </a:rPr>
+              <a:t>450,000 Daily Transactions </a:t>
+            </a:r>
+            <a:r>
+              <a:rPr lang="en-GB" sz="1900" dirty="0">
+                <a:solidFill>
+                  <a:schemeClr val="dk1"/>
+                </a:solidFill>
+              </a:rPr>
+              <a:t>on Hedera Consensus Service.</a:t>
+            </a:r>
+          </a:p>
+          <a:p>
+            <a:pPr marL="914400" lvl="0" indent="-304800" algn="l" rtl="0">
+              <a:spcBef>
+                <a:spcPts val="0"/>
+              </a:spcBef>
+              <a:spcAft>
+                <a:spcPts val="0"/>
+              </a:spcAft>
+              <a:buClr>
+                <a:schemeClr val="accent1"/>
+              </a:buClr>
+              <a:buSzPts val="1200"/>
+              <a:buFont typeface="Zilla Slab"/>
+              <a:buChar char="●"/>
+            </a:pPr>
+            <a:endParaRPr sz="1900" dirty="0">
+              <a:solidFill>
+                <a:schemeClr val="dk1"/>
+              </a:solidFill>
+            </a:endParaRPr>
+          </a:p>
+        </p:txBody>
+      </p:sp>
+      <p:sp>
+        <p:nvSpPr>
+          <p:cNvPr id="5" name="TextBox 4">
+            <a:extLst>
+              <a:ext uri="{FF2B5EF4-FFF2-40B4-BE49-F238E27FC236}">
+                <a16:creationId xmlns:a16="http://schemas.microsoft.com/office/drawing/2014/main" id="{1B6BC203-63DD-5E69-D882-163E169AEB41}"/>
+              </a:ext>
+            </a:extLst>
+          </p:cNvPr>
+          <p:cNvSpPr txBox="1"/>
+          <p:nvPr/>
+        </p:nvSpPr>
+        <p:spPr>
+          <a:xfrm>
+            <a:off x="111867" y="1277107"/>
+            <a:ext cx="8411933" cy="492443"/>
+          </a:xfrm>
+          <a:prstGeom prst="rect">
+            <a:avLst/>
+          </a:prstGeom>
+          <a:noFill/>
+        </p:spPr>
+        <p:txBody>
+          <a:bodyPr wrap="square">
+            <a:spAutoFit/>
+          </a:bodyPr>
+          <a:lstStyle/>
+          <a:p>
+            <a:pPr marL="914400" marR="0" lvl="0" indent="-304800" algn="l" defTabSz="914400" rtl="0" eaLnBrk="1" fontAlgn="auto" latinLnBrk="0" hangingPunct="1">
+              <a:lnSpc>
+                <a:spcPct val="100000"/>
+              </a:lnSpc>
+              <a:spcBef>
+                <a:spcPts val="0"/>
+              </a:spcBef>
+              <a:spcAft>
+                <a:spcPts val="0"/>
+              </a:spcAft>
+              <a:buClr>
+                <a:srgbClr val="FF7E5A"/>
+              </a:buClr>
+              <a:buSzPts val="1200"/>
+              <a:buFont typeface="Zilla Slab"/>
+              <a:buChar char="●"/>
+              <a:tabLst/>
+              <a:defRPr/>
+            </a:pPr>
+            <a:r>
+              <a:rPr lang="en-GB" sz="2600" dirty="0">
+                <a:solidFill>
+                  <a:srgbClr val="102F2E"/>
+                </a:solidFill>
+                <a:latin typeface="Advent Pro SemiBold"/>
+                <a:sym typeface="Advent Pro SemiBold"/>
+              </a:rPr>
+              <a:t>This isn't just a South African solution; it's a</a:t>
+            </a:r>
+            <a:r>
+              <a:rPr lang="en-GB" sz="2600" dirty="0">
+                <a:solidFill>
+                  <a:srgbClr val="FF7E5A"/>
+                </a:solidFill>
+                <a:uFill>
+                  <a:noFill/>
+                </a:uFill>
+                <a:latin typeface="Advent Pro SemiBold"/>
+                <a:sym typeface="Advent Pro SemiBold"/>
+              </a:rPr>
+              <a:t> global model.</a:t>
+            </a:r>
+          </a:p>
+        </p:txBody>
+      </p:sp>
+    </p:spTree>
+    <p:extLst>
+      <p:ext uri="{BB962C8B-B14F-4D97-AF65-F5344CB8AC3E}">
+        <p14:creationId xmlns:p14="http://schemas.microsoft.com/office/powerpoint/2010/main" val="3346341612"/>
+      </p:ext>
+    </p:extLst>
+  </p:cSld>
+  <p:clrMapOvr>
+    <a:masterClrMapping/>
+  </p:clrMapOvr>
+</p:sld>
+</file>
+
+<file path=ppt/slides/slide11.xml><?xml version="1.0" encoding="utf-8"?>
+<p:sld xmlns:a="http://schemas.openxmlformats.org/drawingml/2006/main" xmlns:r="http://schemas.openxmlformats.org/officeDocument/2006/relationships" xmlns:p="http://schemas.openxmlformats.org/presentationml/2006/main">
+  <p:cSld>
+    <p:spTree>
+      <p:nvGrpSpPr>
+        <p:cNvPr id="1" name="Shape 674">
+          <a:extLst>
+            <a:ext uri="{FF2B5EF4-FFF2-40B4-BE49-F238E27FC236}">
               <a16:creationId xmlns:a16="http://schemas.microsoft.com/office/drawing/2014/main" id="{632A165F-E8AA-499B-BA24-2C130E92F9E5}"/>
             </a:ext>
           </a:extLst>
@@ -25145,21 +25761,10 @@
                   <a:noFill/>
                 </a:uFill>
               </a:rPr>
-              <a:t>VeriCycle Operator Account</a:t>
+              <a:t>VeriCycle Operator Account: </a:t>
             </a:r>
             <a:r>
-              <a:rPr lang="en-GB" sz="1600">
-                <a:solidFill>
-                  <a:schemeClr val="accent1"/>
-                </a:solidFill>
-                <a:uFill>
-                  <a:noFill/>
-                </a:uFill>
-              </a:rPr>
-              <a:t>: </a:t>
-            </a:r>
-            <a:r>
-              <a:rPr lang="en-GB" sz="1600">
+              <a:rPr lang="en-GB" sz="1600" dirty="0">
                 <a:solidFill>
                   <a:schemeClr val="accent1"/>
                 </a:solidFill>
@@ -25170,7 +25775,7 @@
               </a:rPr>
               <a:t>https://hashscan.io/testnet/account/0.0.7108458</a:t>
             </a:r>
-            <a:endParaRPr lang="en-GB" sz="1600">
+            <a:endParaRPr lang="en-GB" sz="1600" dirty="0">
               <a:solidFill>
                 <a:schemeClr val="accent1"/>
               </a:solidFill>
@@ -25836,7 +26441,7 @@
 </p:sld>
 </file>
 
-<file path=ppt/slides/slide11.xml><?xml version="1.0" encoding="utf-8"?>
+<file path=ppt/slides/slide12.xml><?xml version="1.0" encoding="utf-8"?>
 <p:sld xmlns:a="http://schemas.openxmlformats.org/drawingml/2006/main" xmlns:r="http://schemas.openxmlformats.org/officeDocument/2006/relationships" xmlns:p="http://schemas.openxmlformats.org/presentationml/2006/main">
   <p:cSld>
     <p:spTree>
@@ -30824,7 +31429,7 @@
         <p:spPr>
           <a:xfrm>
             <a:off x="197186" y="2953773"/>
-            <a:ext cx="1731965" cy="738664"/>
+            <a:ext cx="1731965" cy="1384995"/>
           </a:xfrm>
           <a:prstGeom prst="rect">
             <a:avLst/>
@@ -30837,13 +31442,14 @@
           </a:bodyPr>
           <a:lstStyle/>
           <a:p>
+            <a:pPr algn="ctr"/>
             <a:r>
               <a:rPr lang="en-GB" sz="1050" dirty="0">
                 <a:highlight>
                   <a:srgbClr val="FFFF00"/>
                 </a:highlight>
               </a:rPr>
-              <a:t>South Africa's recycling system is built on the backs of </a:t>
+              <a:t>South Africa has </a:t>
             </a:r>
             <a:r>
               <a:rPr lang="en-GB" sz="1050" b="1" dirty="0">
@@ -30859,7 +31465,39 @@
                   <a:srgbClr val="FFFF00"/>
                 </a:highlight>
               </a:rPr>
-              <a:t>.</a:t>
+              <a:t> who recover </a:t>
+            </a:r>
+            <a:r>
+              <a:rPr lang="en-GB" sz="1050" b="1" dirty="0">
+                <a:highlight>
+                  <a:srgbClr val="FFFF00"/>
+                </a:highlight>
+              </a:rPr>
+              <a:t>80-90%</a:t>
+            </a:r>
+            <a:r>
+              <a:rPr lang="en-GB" sz="1050" dirty="0">
+                <a:highlight>
+                  <a:srgbClr val="FFFF00"/>
+                </a:highlight>
+              </a:rPr>
+              <a:t> of all packaging waste yet remain unbanked. This is a </a:t>
+            </a:r>
+            <a:r>
+              <a:rPr lang="en-GB" sz="1050" b="1" dirty="0">
+                <a:highlight>
+                  <a:srgbClr val="FFFF00"/>
+                </a:highlight>
+              </a:rPr>
+              <a:t>verified humanitarian and economic crisis</a:t>
+            </a:r>
+            <a:r>
+              <a:rPr lang="en-GB" sz="1050" dirty="0">
+                <a:highlight>
+                  <a:srgbClr val="FFFF00"/>
+                </a:highlight>
+              </a:rPr>
+              <a:t> that requires a Web3 solution.</a:t>
             </a:r>
             <a:endParaRPr lang="en-ZA" sz="1050" dirty="0">
               <a:highlight>
@@ -31327,7 +31965,7 @@
             </a:pPr>
             <a:r>
               <a:rPr lang="en-GB" sz="1600" dirty="0"/>
-              <a:t>This is our key innovation. Using HCS, we create an immutable, auditable log of their earnings—a document they can take to a bank.</a:t>
+              <a:t>This is our key innovation. Using HCS, we create an immutable, auditable log of their earnings, a document they can take to a bank.</a:t>
             </a:r>
             <a:endParaRPr sz="1100" dirty="0"/>
           </a:p>
@@ -35924,8 +36562,8 @@
         </p:nvSpPr>
         <p:spPr>
           <a:xfrm>
-            <a:off x="2758400" y="1407027"/>
-            <a:ext cx="5867439" cy="2314355"/>
+            <a:off x="2748878" y="1231444"/>
+            <a:ext cx="5867439" cy="2920393"/>
           </a:xfrm>
           <a:prstGeom prst="rect">
             <a:avLst/>
@@ -36009,6 +36647,65 @@
               <a:t>H3dera!2025</a:t>
             </a:r>
             <a:endParaRPr lang="en-GB" sz="2000" dirty="0"/>
+          </a:p>
+          <a:p>
+            <a:pPr lvl="0">
+              <a:spcBef>
+                <a:spcPts val="1000"/>
+              </a:spcBef>
+            </a:pPr>
+            <a:r>
+              <a:rPr lang="en-GB" sz="2000" b="1" dirty="0"/>
+              <a:t>Demo Account:</a:t>
+            </a:r>
+            <a:endParaRPr lang="en-GB" sz="2000" dirty="0"/>
+          </a:p>
+          <a:p>
+            <a:pPr lvl="1">
+              <a:lnSpc>
+                <a:spcPct val="100000"/>
+              </a:lnSpc>
+            </a:pPr>
+            <a:r>
+              <a:rPr lang="en-GB" sz="2000" b="1" dirty="0"/>
+              <a:t>Demo Login:</a:t>
+            </a:r>
+            <a:r>
+              <a:rPr lang="en-GB" sz="2000" dirty="0"/>
+              <a:t> </a:t>
+            </a:r>
+            <a:r>
+              <a:rPr lang="en-GB" sz="1800" dirty="0"/>
+              <a:t>mpact@vericycle.com</a:t>
+            </a:r>
+            <a:endParaRPr lang="en-GB" sz="2000" dirty="0"/>
+          </a:p>
+          <a:p>
+            <a:pPr lvl="1">
+              <a:lnSpc>
+                <a:spcPct val="100000"/>
+              </a:lnSpc>
+            </a:pPr>
+            <a:r>
+              <a:rPr lang="en-GB" sz="2000" b="1" dirty="0"/>
+              <a:t>Password</a:t>
+            </a:r>
+            <a:r>
+              <a:rPr lang="en-GB" sz="2000" b="1"/>
+              <a:t>:</a:t>
+            </a:r>
+            <a:r>
+              <a:rPr lang="en-GB" sz="2000"/>
+              <a:t> </a:t>
+            </a:r>
+            <a:r>
+              <a:rPr lang="en-GB" sz="1800"/>
+              <a:t>Centerh3dera!</a:t>
+            </a:r>
+            <a:endParaRPr lang="en-GB" sz="2000" dirty="0"/>
+          </a:p>
+          <a:p>
+            <a:endParaRPr lang="en-GB" sz="1800" dirty="0"/>
           </a:p>
         </p:txBody>
       </p:sp>
@@ -41106,8 +41803,8 @@
         </p:nvSpPr>
         <p:spPr>
           <a:xfrm>
-            <a:off x="5869444" y="2877113"/>
-            <a:ext cx="2338029" cy="576000"/>
+            <a:off x="6077846" y="2869360"/>
+            <a:ext cx="1957011" cy="576000"/>
           </a:xfrm>
           <a:prstGeom prst="rect">
             <a:avLst/>
@@ -41380,7 +42077,7 @@
                   <a:schemeClr val="dk2"/>
                 </a:solidFill>
               </a:rPr>
-              <a:t>Neighbourhood Partnerships</a:t>
+              <a:t>Roadmap &amp; Business Model</a:t>
             </a:r>
           </a:p>
         </p:txBody>
@@ -41416,85 +42113,21 @@
           </a:bodyPr>
           <a:lstStyle/>
           <a:p>
-            <a:pPr marL="0" lvl="0" indent="0" algn="ctr" rtl="0">
-              <a:spcBef>
-                <a:spcPts val="0"/>
-              </a:spcBef>
-              <a:spcAft>
-                <a:spcPts val="0"/>
-              </a:spcAft>
-              <a:buNone/>
-            </a:pPr>
+            <a:pPr lvl="0" algn="ctr"/>
             <a:r>
-              <a:rPr lang="en-GB" sz="1300" dirty="0">
+              <a:rPr lang="en-GB" dirty="0">
                 <a:solidFill>
                   <a:schemeClr val="dk1"/>
                 </a:solidFill>
                 <a:latin typeface="Advent Pro SemiBold"/>
-                <a:ea typeface="Advent Pro SemiBold"/>
-                <a:cs typeface="Advent Pro SemiBold"/>
-                <a:sym typeface="Advent Pro SemiBold"/>
               </a:rPr>
-              <a:t>Standard municipal pickups are a tax-funded cost. </a:t>
+              <a:t>B2G Revenue Model: We charge municipalities a Data Service Fee (R0.10/kg) for verified waste diversion reports, saving them millions in landfill costs.</a:t>
             </a:r>
-            <a:r>
-              <a:rPr lang="en-GB" sz="1300" dirty="0" err="1">
-                <a:solidFill>
-                  <a:schemeClr val="dk1"/>
-                </a:solidFill>
-                <a:latin typeface="Advent Pro SemiBold"/>
-                <a:ea typeface="Advent Pro SemiBold"/>
-                <a:cs typeface="Advent Pro SemiBold"/>
-                <a:sym typeface="Advent Pro SemiBold"/>
-              </a:rPr>
-              <a:t>VeriCycle's</a:t>
-            </a:r>
-            <a:r>
-              <a:rPr lang="en-GB" sz="1300" dirty="0">
-                <a:solidFill>
-                  <a:schemeClr val="dk1"/>
-                </a:solidFill>
-                <a:latin typeface="Advent Pro SemiBold"/>
-                <a:ea typeface="Advent Pro SemiBold"/>
-                <a:cs typeface="Advent Pro SemiBold"/>
-                <a:sym typeface="Advent Pro SemiBold"/>
-              </a:rPr>
-              <a:t> pickups are a profit-driven service. We use data to create optimized routes and gamify recycling with our 'High-Activity Discount', turning a city </a:t>
-            </a:r>
-            <a:r>
-              <a:rPr lang="en-GB" sz="1300" dirty="0">
-                <a:solidFill>
-                  <a:schemeClr val="dk1"/>
-                </a:solidFill>
-                <a:highlight>
-                  <a:srgbClr val="C0C0C0"/>
-                </a:highlight>
-                <a:latin typeface="Advent Pro SemiBold"/>
-                <a:ea typeface="Advent Pro SemiBold"/>
-                <a:cs typeface="Advent Pro SemiBold"/>
-                <a:sym typeface="Advent Pro SemiBold"/>
-              </a:rPr>
-              <a:t>expense into </a:t>
-            </a:r>
-            <a:r>
-              <a:rPr lang="en-GB" sz="1300" dirty="0">
-                <a:solidFill>
-                  <a:schemeClr val="dk1"/>
-                </a:solidFill>
-                <a:latin typeface="Advent Pro SemiBold"/>
-                <a:ea typeface="Advent Pro SemiBold"/>
-                <a:cs typeface="Advent Pro SemiBold"/>
-                <a:sym typeface="Advent Pro SemiBold"/>
-              </a:rPr>
-              <a:t>a community reward.</a:t>
-            </a:r>
-            <a:endParaRPr sz="1300" dirty="0">
+            <a:endParaRPr dirty="0">
               <a:solidFill>
                 <a:schemeClr val="dk1"/>
               </a:solidFill>
               <a:latin typeface="Advent Pro SemiBold"/>
-              <a:ea typeface="Advent Pro SemiBold"/>
-              <a:cs typeface="Advent Pro SemiBold"/>
               <a:sym typeface="Advent Pro SemiBold"/>
             </a:endParaRPr>
           </a:p>
@@ -41623,7 +42256,7 @@
         <p:cNvPr id="1" name="Shape 674">
           <a:extLst>
             <a:ext uri="{FF2B5EF4-FFF2-40B4-BE49-F238E27FC236}">
-              <a16:creationId xmlns:a16="http://schemas.microsoft.com/office/drawing/2014/main" id="{F7CDCD18-B0F1-BA9F-DEC5-6B8E09801327}"/>
+              <a16:creationId xmlns:a16="http://schemas.microsoft.com/office/drawing/2014/main" id="{68DA672C-842F-CD15-2922-6E9D47DB50C8}"/>
             </a:ext>
           </a:extLst>
         </p:cNvPr>
@@ -41643,7 +42276,7 @@
           <p:cNvPr id="675" name="Google Shape;675;p34">
             <a:extLst>
               <a:ext uri="{FF2B5EF4-FFF2-40B4-BE49-F238E27FC236}">
-                <a16:creationId xmlns:a16="http://schemas.microsoft.com/office/drawing/2014/main" id="{D1660E3F-31E4-C001-44F0-BE3772CC8982}"/>
+                <a16:creationId xmlns:a16="http://schemas.microsoft.com/office/drawing/2014/main" id="{3AB3CBCF-58DA-2D1C-B7DB-780D7C729FD0}"/>
               </a:ext>
             </a:extLst>
           </p:cNvPr>
@@ -41656,7 +42289,7 @@
         </p:nvSpPr>
         <p:spPr>
           <a:xfrm>
-            <a:off x="264267" y="624150"/>
+            <a:off x="365957" y="564516"/>
             <a:ext cx="8615315" cy="572700"/>
           </a:xfrm>
           <a:prstGeom prst="rect">
@@ -41669,18 +42302,10 @@
           </a:bodyPr>
           <a:lstStyle/>
           <a:p>
-            <a:pPr marL="0" lvl="0" indent="0" algn="ctr" rtl="0">
-              <a:spcBef>
-                <a:spcPts val="0"/>
-              </a:spcBef>
-              <a:spcAft>
-                <a:spcPts val="0"/>
-              </a:spcAft>
-              <a:buNone/>
-            </a:pPr>
+            <a:pPr lvl="0"/>
             <a:r>
-              <a:rPr lang="en-GB" sz="3800" dirty="0"/>
-              <a:t>A Global Blueprint for Incentivized Recycling</a:t>
+              <a:rPr lang="en-GB" sz="3600" dirty="0"/>
+              <a:t>Sustainability Model (How We Scale)</a:t>
             </a:r>
             <a:endParaRPr sz="3800" dirty="0"/>
           </a:p>
@@ -41691,7 +42316,7 @@
           <p:cNvPr id="676" name="Google Shape;676;p34">
             <a:extLst>
               <a:ext uri="{FF2B5EF4-FFF2-40B4-BE49-F238E27FC236}">
-                <a16:creationId xmlns:a16="http://schemas.microsoft.com/office/drawing/2014/main" id="{BEABEEE1-7859-AABB-8258-C882F74501F5}"/>
+                <a16:creationId xmlns:a16="http://schemas.microsoft.com/office/drawing/2014/main" id="{5893D2C8-C7F9-3939-6160-9AC8A8291EDA}"/>
               </a:ext>
             </a:extLst>
           </p:cNvPr>
@@ -41704,51 +42329,28 @@
         </p:nvSpPr>
         <p:spPr>
           <a:xfrm>
-            <a:off x="726576" y="1769550"/>
-            <a:ext cx="7385713" cy="2940898"/>
+            <a:off x="956090" y="1205066"/>
+            <a:ext cx="7231666" cy="3230034"/>
           </a:xfrm>
           <a:prstGeom prst="rect">
             <a:avLst/>
           </a:prstGeom>
         </p:spPr>
         <p:txBody>
-          <a:bodyPr spcFirstLastPara="1" wrap="square" lIns="91425" tIns="91425" rIns="91425" bIns="91425" anchor="ctr" anchorCtr="0">
+          <a:bodyPr spcFirstLastPara="1" wrap="square" lIns="91425" tIns="91425" rIns="91425" bIns="91425" numCol="1" anchor="ctr" anchorCtr="0">
             <a:noAutofit/>
           </a:bodyPr>
           <a:lstStyle/>
           <a:p>
-            <a:pPr marL="914400" lvl="0" indent="-304800" algn="l" rtl="0">
-              <a:spcBef>
-                <a:spcPts val="0"/>
-              </a:spcBef>
-              <a:spcAft>
-                <a:spcPts val="0"/>
-              </a:spcAft>
+            <a:pPr marL="914400" lvl="0">
               <a:buClr>
                 <a:schemeClr val="accent1"/>
               </a:buClr>
-              <a:buSzPts val="1200"/>
               <a:buFont typeface="Zilla Slab"/>
               <a:buChar char="●"/>
             </a:pPr>
             <a:r>
-              <a:rPr lang="en-GB" sz="2000" b="1" dirty="0">
-                <a:solidFill>
-                  <a:schemeClr val="dk1"/>
-                </a:solidFill>
-              </a:rPr>
-              <a:t>It's for Everyone</a:t>
-            </a:r>
-            <a:r>
-              <a:rPr lang="en-GB" sz="2000" dirty="0">
-                <a:solidFill>
-                  <a:schemeClr val="dk1"/>
-                </a:solidFill>
-              </a:rPr>
-              <a:t>: VeriCycle's model is a universal incentive. It empowers </a:t>
-            </a:r>
-            <a:r>
-              <a:rPr lang="en-GB" sz="2000" dirty="0">
+              <a:rPr lang="en-GB" sz="1800" dirty="0">
                 <a:solidFill>
                   <a:schemeClr val="accent1"/>
                 </a:solidFill>
@@ -41756,18 +42358,63 @@
                   <a:noFill/>
                 </a:uFill>
               </a:rPr>
-              <a:t>informal collectors </a:t>
+              <a:t>B2G Data Fees:</a:t>
             </a:r>
+          </a:p>
+          <a:p>
+            <a:pPr marL="1371600" lvl="1">
+              <a:lnSpc>
+                <a:spcPct val="100000"/>
+              </a:lnSpc>
+              <a:spcBef>
+                <a:spcPts val="0"/>
+              </a:spcBef>
+              <a:buClr>
+                <a:schemeClr val="accent1"/>
+              </a:buClr>
+              <a:buFont typeface="Zilla Slab"/>
+              <a:buChar char="●"/>
+            </a:pPr>
             <a:r>
-              <a:rPr lang="en-GB" sz="2000" dirty="0">
-                <a:solidFill>
-                  <a:schemeClr val="dk1"/>
-                </a:solidFill>
+              <a:rPr lang="en-GB" sz="1600" dirty="0">
+                <a:latin typeface="Advent Pro SemiBold"/>
+                <a:sym typeface="Advent Pro SemiBold"/>
               </a:rPr>
-              <a:t>who do this for a living, but it also rewards </a:t>
+              <a:t>We charge municipalities a Data Fee of $0.01/kg  for verified waste diversion reports.</a:t>
             </a:r>
+          </a:p>
+          <a:p>
+            <a:pPr marL="1371600" lvl="1">
+              <a:lnSpc>
+                <a:spcPct val="100000"/>
+              </a:lnSpc>
+              <a:spcBef>
+                <a:spcPts val="0"/>
+              </a:spcBef>
+              <a:buClr>
+                <a:schemeClr val="accent1"/>
+              </a:buClr>
+              <a:buFont typeface="Zilla Slab"/>
+              <a:buChar char="●"/>
+            </a:pPr>
             <a:r>
-              <a:rPr lang="en-GB" sz="2000" dirty="0">
+              <a:rPr lang="en-GB" sz="1600" dirty="0">
+                <a:latin typeface="Advent Pro SemiBold"/>
+                <a:sym typeface="Advent Pro SemiBold"/>
+              </a:rPr>
+              <a:t>Impact: At 100 tonnes/day, this generates ~$1,000/day while saving cities millions in landfill costs.</a:t>
+            </a:r>
+          </a:p>
+          <a:p>
+            <a:pPr marL="914400">
+              <a:buClr>
+                <a:schemeClr val="accent1"/>
+              </a:buClr>
+              <a:buFont typeface="Zilla Slab"/>
+              <a:buChar char="●"/>
+            </a:pPr>
+            <a:r>
+              <a:rPr lang="en-GB" sz="1800" dirty="0">
                 <a:solidFill>
                   <a:schemeClr val="accent1"/>
                 </a:solidFill>
@@ -41775,18 +42422,41 @@
                   <a:noFill/>
                 </a:uFill>
               </a:rPr>
-              <a:t>formal households </a:t>
+              <a:t>EPR Credits (B2B):</a:t>
             </a:r>
+          </a:p>
+          <a:p>
+            <a:pPr marL="1371600" lvl="1">
+              <a:lnSpc>
+                <a:spcPct val="100000"/>
+              </a:lnSpc>
+              <a:spcBef>
+                <a:spcPts val="0"/>
+              </a:spcBef>
+              <a:buClr>
+                <a:schemeClr val="accent1"/>
+              </a:buClr>
+              <a:buFont typeface="Zilla Slab"/>
+              <a:buChar char="●"/>
+            </a:pPr>
             <a:r>
-              <a:rPr lang="en-GB" sz="2000" dirty="0">
-                <a:solidFill>
-                  <a:schemeClr val="dk1"/>
-                </a:solidFill>
+              <a:rPr lang="en-GB" sz="1600" dirty="0">
+                <a:latin typeface="Advent Pro SemiBold"/>
+                <a:sym typeface="Advent Pro SemiBold"/>
               </a:rPr>
-              <a:t>who already recycle and </a:t>
+              <a:t>We sell "Verified Plastic Credits" to brands (e.g., Coca-Cola) at $30 per tonne for regulatory compliance.</a:t>
             </a:r>
+          </a:p>
+          <a:p>
+            <a:pPr marL="914400">
+              <a:buClr>
+                <a:schemeClr val="accent1"/>
+              </a:buClr>
+              <a:buFont typeface="Zilla Slab"/>
+              <a:buChar char="●"/>
+            </a:pPr>
             <a:r>
-              <a:rPr lang="en-GB" sz="2000" dirty="0">
+              <a:rPr lang="en-GB" sz="1800" dirty="0">
                 <a:solidFill>
                   <a:schemeClr val="accent1"/>
                 </a:solidFill>
@@ -41794,125 +42464,66 @@
                   <a:noFill/>
                 </a:uFill>
               </a:rPr>
-              <a:t>encourages new people </a:t>
-            </a:r>
-            <a:r>
-              <a:rPr lang="en-GB" sz="2000" dirty="0">
-                <a:solidFill>
-                  <a:schemeClr val="dk1"/>
-                </a:solidFill>
-              </a:rPr>
-              <a:t>to start.</a:t>
+              <a:t>Financial Leads (B2B):</a:t>
             </a:r>
           </a:p>
           <a:p>
-            <a:pPr marL="914400" lvl="0" indent="-304800" algn="l" rtl="0">
+            <a:pPr marL="1371600" lvl="1">
+              <a:lnSpc>
+                <a:spcPct val="100000"/>
+              </a:lnSpc>
               <a:spcBef>
                 <a:spcPts val="0"/>
               </a:spcBef>
-              <a:spcAft>
-                <a:spcPts val="0"/>
-              </a:spcAft>
               <a:buClr>
                 <a:schemeClr val="accent1"/>
               </a:buClr>
-              <a:buSzPts val="1200"/>
               <a:buFont typeface="Zilla Slab"/>
               <a:buChar char="●"/>
             </a:pPr>
             <a:r>
-              <a:rPr lang="en-GB" sz="2000" b="1" dirty="0">
-                <a:solidFill>
-                  <a:schemeClr val="dk1"/>
-                </a:solidFill>
+              <a:rPr lang="en-GB" sz="1600" dirty="0">
+                <a:latin typeface="Advent Pro SemiBold"/>
+                <a:sym typeface="Advent Pro SemiBold"/>
               </a:rPr>
-              <a:t>The Model is Universal</a:t>
+              <a:t>Banks pay a $3.00 Referral Fee for every unbanked collector verified via our "Proof of Income.“</a:t>
             </a:r>
-            <a:r>
-              <a:rPr lang="en-GB" sz="2000" dirty="0">
-                <a:solidFill>
-                  <a:schemeClr val="dk1"/>
-                </a:solidFill>
-              </a:rPr>
-              <a:t>: The problem of "incentive vs. convenience" is global. Our Hedera-based blueprint—a trusted, low-cost, verifiable rewards system—can be deployed in any city worldwide.</a:t>
-            </a:r>
-            <a:endParaRPr sz="2000" dirty="0">
-              <a:solidFill>
-                <a:schemeClr val="dk1"/>
-              </a:solidFill>
-            </a:endParaRPr>
           </a:p>
-        </p:txBody>
-      </p:sp>
-      <p:sp>
-        <p:nvSpPr>
-          <p:cNvPr id="5" name="TextBox 4">
-            <a:extLst>
-              <a:ext uri="{FF2B5EF4-FFF2-40B4-BE49-F238E27FC236}">
-                <a16:creationId xmlns:a16="http://schemas.microsoft.com/office/drawing/2014/main" id="{1B6BC203-63DD-5E69-D882-163E169AEB41}"/>
-              </a:ext>
-            </a:extLst>
-          </p:cNvPr>
-          <p:cNvSpPr txBox="1"/>
-          <p:nvPr/>
-        </p:nvSpPr>
-        <p:spPr>
-          <a:xfrm>
-            <a:off x="111867" y="1277107"/>
-            <a:ext cx="8411933" cy="492443"/>
-          </a:xfrm>
-          <a:prstGeom prst="rect">
-            <a:avLst/>
-          </a:prstGeom>
-          <a:noFill/>
-        </p:spPr>
-        <p:txBody>
-          <a:bodyPr wrap="square">
-            <a:spAutoFit/>
-          </a:bodyPr>
-          <a:lstStyle/>
           <a:p>
-            <a:pPr marL="914400" marR="0" lvl="0" indent="-304800" algn="l" defTabSz="914400" rtl="0" eaLnBrk="1" fontAlgn="auto" latinLnBrk="0" hangingPunct="1">
+            <a:pPr marL="1371600" lvl="1">
               <a:lnSpc>
                 <a:spcPct val="100000"/>
               </a:lnSpc>
               <a:spcBef>
                 <a:spcPts val="0"/>
               </a:spcBef>
-              <a:spcAft>
-                <a:spcPts val="0"/>
-              </a:spcAft>
               <a:buClr>
-                <a:srgbClr val="FF7E5A"/>
+                <a:schemeClr val="accent1"/>
               </a:buClr>
-              <a:buSzPts val="1200"/>
               <a:buFont typeface="Zilla Slab"/>
               <a:buChar char="●"/>
-              <a:tabLst/>
-              <a:defRPr/>
             </a:pPr>
             <a:r>
-              <a:rPr lang="en-GB" sz="2600" dirty="0">
-                <a:solidFill>
-                  <a:srgbClr val="102F2E"/>
-                </a:solidFill>
+              <a:rPr lang="en-GB" sz="1600" dirty="0">
                 <a:latin typeface="Advent Pro SemiBold"/>
                 <a:sym typeface="Advent Pro SemiBold"/>
               </a:rPr>
-              <a:t>This isn't just a South African solution; it's a</a:t>
+              <a:t>Opportunity: 90,000 users = $270,000 immediate revenue potential..</a:t>
             </a:r>
+          </a:p>
+          <a:p>
+            <a:pPr marL="609600" indent="0">
+              <a:buClr>
+                <a:schemeClr val="accent1"/>
+              </a:buClr>
+              <a:buNone/>
+            </a:pPr>
             <a:r>
-              <a:rPr lang="en-GB" sz="2600" dirty="0">
-                <a:solidFill>
-                  <a:srgbClr val="FF7E5A"/>
-                </a:solidFill>
-                <a:uFill>
-                  <a:noFill/>
-                </a:uFill>
+              <a:rPr lang="en-GB" sz="1600" i="1" dirty="0">
                 <a:latin typeface="Advent Pro SemiBold"/>
                 <a:sym typeface="Advent Pro SemiBold"/>
               </a:rPr>
-              <a:t> global model.</a:t>
+              <a:t>Note: These figures represent the South African Minimum Obtainable Market. The platform is designed to scale to the 20 million informal recyclers globally.</a:t>
             </a:r>
           </a:p>
         </p:txBody>
@@ -41920,7 +42531,7 @@
     </p:spTree>
     <p:extLst>
       <p:ext uri="{BB962C8B-B14F-4D97-AF65-F5344CB8AC3E}">
-        <p14:creationId xmlns:p14="http://schemas.microsoft.com/office/powerpoint/2010/main" val="3346341612"/>
+        <p14:creationId xmlns:p14="http://schemas.microsoft.com/office/powerpoint/2010/main" val="3544684066"/>
       </p:ext>
     </p:extLst>
   </p:cSld>

</xml_diff>

<commit_message>
Implement code changes to enhance functionality and improve performance
</commit_message>
<xml_diff>
--- a/Vericycle Pitch Deck.pptx
+++ b/Vericycle Pitch Deck.pptx
@@ -291,7 +291,7 @@
 <file path=ppt/revisionInfo.xml><?xml version="1.0" encoding="utf-8"?>
 <p1510:revInfo xmlns:a="http://schemas.openxmlformats.org/drawingml/2006/main" xmlns:r="http://schemas.openxmlformats.org/officeDocument/2006/relationships" xmlns:p1510="http://schemas.microsoft.com/office/powerpoint/2015/10/main">
   <p1510:revLst>
-    <p1510:client id="{BADD8881-CF52-44A3-AC4A-94C3126486E0}" v="33" dt="2025-11-21T20:21:29.556"/>
+    <p1510:client id="{BADD8881-CF52-44A3-AC4A-94C3126486E0}" v="35" dt="2025-11-22T00:49:21.137"/>
   </p1510:revLst>
 </p1510:revInfo>
 </file>
@@ -301,7 +301,7 @@
   <pc:docChgLst>
     <pc:chgData name="Noma Ncube" userId="c5bd3073de45acf7" providerId="LiveId" clId="{94FB0B1B-DAC1-4DF4-852D-A426A8D32563}"/>
     <pc:docChg chg="undo custSel addSld modSld sldOrd">
-      <pc:chgData name="Noma Ncube" userId="c5bd3073de45acf7" providerId="LiveId" clId="{94FB0B1B-DAC1-4DF4-852D-A426A8D32563}" dt="2025-11-21T20:34:19.077" v="343"/>
+      <pc:chgData name="Noma Ncube" userId="c5bd3073de45acf7" providerId="LiveId" clId="{94FB0B1B-DAC1-4DF4-852D-A426A8D32563}" dt="2025-11-22T00:49:08.957" v="345"/>
       <pc:docMkLst>
         <pc:docMk/>
       </pc:docMkLst>
@@ -359,13 +359,13 @@
         </pc:spChg>
       </pc:sldChg>
       <pc:sldChg chg="modSp mod">
-        <pc:chgData name="Noma Ncube" userId="c5bd3073de45acf7" providerId="LiveId" clId="{94FB0B1B-DAC1-4DF4-852D-A426A8D32563}" dt="2025-11-21T20:34:19.077" v="343"/>
+        <pc:chgData name="Noma Ncube" userId="c5bd3073de45acf7" providerId="LiveId" clId="{94FB0B1B-DAC1-4DF4-852D-A426A8D32563}" dt="2025-11-22T00:49:08.957" v="345"/>
         <pc:sldMkLst>
           <pc:docMk/>
           <pc:sldMk cId="701395597" sldId="318"/>
         </pc:sldMkLst>
         <pc:spChg chg="mod">
-          <ac:chgData name="Noma Ncube" userId="c5bd3073de45acf7" providerId="LiveId" clId="{94FB0B1B-DAC1-4DF4-852D-A426A8D32563}" dt="2025-11-21T20:34:19.077" v="343"/>
+          <ac:chgData name="Noma Ncube" userId="c5bd3073de45acf7" providerId="LiveId" clId="{94FB0B1B-DAC1-4DF4-852D-A426A8D32563}" dt="2025-11-22T00:49:08.957" v="345"/>
           <ac:spMkLst>
             <pc:docMk/>
             <pc:sldMk cId="701395597" sldId="318"/>
@@ -36584,6 +36584,13 @@
               <a:rPr lang="en-GB" sz="2000" dirty="0"/>
               <a:t>Click Here to Watch the Full Demo on YouTube: </a:t>
             </a:r>
+            <a:r>
+              <a:rPr lang="en-GB" sz="2000" dirty="0">
+                <a:hlinkClick r:id="rId3"/>
+              </a:rPr>
+              <a:t>https://youtu.be/Tj-i2-C7dGQ</a:t>
+            </a:r>
+            <a:endParaRPr lang="en-GB" sz="2000" dirty="0"/>
           </a:p>
           <a:p>
             <a:pPr lvl="0">
@@ -36595,6 +36602,13 @@
               <a:rPr lang="en-ZA" sz="2000" dirty="0"/>
               <a:t>Live App Link: </a:t>
             </a:r>
+            <a:r>
+              <a:rPr lang="en-ZA" sz="2000" dirty="0">
+                <a:hlinkClick r:id="rId4"/>
+              </a:rPr>
+              <a:t>https://vericycle.onrender.com</a:t>
+            </a:r>
+            <a:endParaRPr lang="en-ZA" sz="2000" dirty="0"/>
           </a:p>
           <a:p>
             <a:pPr lvl="0">
@@ -36688,18 +36702,14 @@
             </a:pPr>
             <a:r>
               <a:rPr lang="en-GB" sz="2000" b="1" dirty="0"/>
-              <a:t>Password</a:t>
+              <a:t>Password:</a:t>
             </a:r>
             <a:r>
-              <a:rPr lang="en-GB" sz="2000" b="1"/>
-              <a:t>:</a:t>
-            </a:r>
-            <a:r>
-              <a:rPr lang="en-GB" sz="2000"/>
+              <a:rPr lang="en-GB" sz="2000" dirty="0"/>
               <a:t> </a:t>
             </a:r>
             <a:r>
-              <a:rPr lang="en-GB" sz="1800"/>
+              <a:rPr lang="en-GB" sz="1800" dirty="0"/>
               <a:t>Centerh3dera!</a:t>
             </a:r>
             <a:endParaRPr lang="en-GB" sz="2000" dirty="0"/>

</xml_diff>